<commit_message>
change log to insert in BDD
</commit_message>
<xml_diff>
--- a/doc/Présentation borne.pptx
+++ b/doc/Présentation borne.pptx
@@ -9371,6 +9371,142 @@
           </a:p>
         </p:txBody>
       </p:sp>
+      <p:sp>
+        <p:nvSpPr>
+          <p:cNvPr id="5" name="Accolade fermante 4"/>
+          <p:cNvSpPr/>
+          <p:nvPr/>
+        </p:nvSpPr>
+        <p:spPr>
+          <a:xfrm>
+            <a:off x="10238704" y="2133600"/>
+            <a:ext cx="643944" cy="3352800"/>
+          </a:xfrm>
+          <a:prstGeom prst="rightBrace">
+            <a:avLst/>
+          </a:prstGeom>
+        </p:spPr>
+        <p:style>
+          <a:lnRef idx="1">
+            <a:schemeClr val="accent1"/>
+          </a:lnRef>
+          <a:fillRef idx="0">
+            <a:schemeClr val="accent1"/>
+          </a:fillRef>
+          <a:effectRef idx="0">
+            <a:schemeClr val="accent1"/>
+          </a:effectRef>
+          <a:fontRef idx="minor">
+            <a:schemeClr val="tx1"/>
+          </a:fontRef>
+        </p:style>
+        <p:txBody>
+          <a:bodyPr rtlCol="0" anchor="ctr"/>
+          <a:lstStyle/>
+          <a:p>
+            <a:pPr algn="ctr"/>
+            <a:endParaRPr lang="fr-FR"/>
+          </a:p>
+        </p:txBody>
+      </p:sp>
+      <p:sp>
+        <p:nvSpPr>
+          <p:cNvPr id="6" name="ZoneTexte 5"/>
+          <p:cNvSpPr txBox="1"/>
+          <p:nvPr/>
+        </p:nvSpPr>
+        <p:spPr>
+          <a:xfrm>
+            <a:off x="10920511" y="3629747"/>
+            <a:ext cx="1506828" cy="369332"/>
+          </a:xfrm>
+          <a:prstGeom prst="rect">
+            <a:avLst/>
+          </a:prstGeom>
+          <a:noFill/>
+        </p:spPr>
+        <p:txBody>
+          <a:bodyPr wrap="square" rtlCol="0">
+            <a:spAutoFit/>
+          </a:bodyPr>
+          <a:lstStyle/>
+          <a:p>
+            <a:r>
+              <a:rPr lang="fr-FR" dirty="0" smtClean="0"/>
+              <a:t>10/15 min</a:t>
+            </a:r>
+            <a:endParaRPr lang="fr-FR" dirty="0"/>
+          </a:p>
+        </p:txBody>
+      </p:sp>
+      <p:sp>
+        <p:nvSpPr>
+          <p:cNvPr id="7" name="ZoneTexte 6"/>
+          <p:cNvSpPr txBox="1"/>
+          <p:nvPr/>
+        </p:nvSpPr>
+        <p:spPr>
+          <a:xfrm>
+            <a:off x="11009290" y="5541890"/>
+            <a:ext cx="1506828" cy="369332"/>
+          </a:xfrm>
+          <a:prstGeom prst="rect">
+            <a:avLst/>
+          </a:prstGeom>
+          <a:noFill/>
+        </p:spPr>
+        <p:txBody>
+          <a:bodyPr wrap="square" rtlCol="0">
+            <a:spAutoFit/>
+          </a:bodyPr>
+          <a:lstStyle/>
+          <a:p>
+            <a:r>
+              <a:rPr lang="fr-FR" dirty="0" smtClean="0"/>
+              <a:t>5 min</a:t>
+            </a:r>
+            <a:endParaRPr lang="fr-FR" dirty="0"/>
+          </a:p>
+        </p:txBody>
+      </p:sp>
+      <p:sp>
+        <p:nvSpPr>
+          <p:cNvPr id="8" name="Accolade fermante 7"/>
+          <p:cNvSpPr/>
+          <p:nvPr/>
+        </p:nvSpPr>
+        <p:spPr>
+          <a:xfrm>
+            <a:off x="10276567" y="5541891"/>
+            <a:ext cx="606081" cy="369331"/>
+          </a:xfrm>
+          <a:prstGeom prst="rightBrace">
+            <a:avLst/>
+          </a:prstGeom>
+        </p:spPr>
+        <p:style>
+          <a:lnRef idx="1">
+            <a:schemeClr val="accent1"/>
+          </a:lnRef>
+          <a:fillRef idx="0">
+            <a:schemeClr val="accent1"/>
+          </a:fillRef>
+          <a:effectRef idx="0">
+            <a:schemeClr val="accent1"/>
+          </a:effectRef>
+          <a:fontRef idx="minor">
+            <a:schemeClr val="tx1"/>
+          </a:fontRef>
+        </p:style>
+        <p:txBody>
+          <a:bodyPr rtlCol="0" anchor="ctr"/>
+          <a:lstStyle/>
+          <a:p>
+            <a:pPr algn="ctr"/>
+            <a:endParaRPr lang="fr-FR"/>
+          </a:p>
+        </p:txBody>
+      </p:sp>
     </p:spTree>
     <p:extLst>
       <p:ext uri="{BB962C8B-B14F-4D97-AF65-F5344CB8AC3E}">
@@ -9455,7 +9591,15 @@
           <a:p>
             <a:r>
               <a:rPr lang="fr-FR" sz="2400" dirty="0" smtClean="0"/>
-              <a:t>Mise en place d’une borne a l’entrée du site de Mouans-Sartoux</a:t>
+              <a:t>Mise en place d’une borne </a:t>
+            </a:r>
+            <a:r>
+              <a:rPr lang="fr-FR" sz="2400" dirty="0" smtClean="0"/>
+              <a:t>à </a:t>
+            </a:r>
+            <a:r>
+              <a:rPr lang="fr-FR" sz="2400" dirty="0" smtClean="0"/>
+              <a:t>l’entrée du site de Mouans-Sartoux</a:t>
             </a:r>
           </a:p>
           <a:p>
@@ -9576,35 +9720,88 @@
             <p:ph idx="1"/>
           </p:nvPr>
         </p:nvSpPr>
-        <p:spPr/>
+        <p:spPr>
+          <a:xfrm>
+            <a:off x="2589212" y="2133600"/>
+            <a:ext cx="8915400" cy="4724400"/>
+          </a:xfrm>
+        </p:spPr>
         <p:txBody>
           <a:bodyPr>
-            <a:normAutofit/>
+            <a:normAutofit lnSpcReduction="10000"/>
           </a:bodyPr>
           <a:lstStyle/>
           <a:p>
             <a:r>
               <a:rPr lang="fr-FR" sz="2400" dirty="0" smtClean="0"/>
-              <a:t>Renseigner ses informations</a:t>
-            </a:r>
-          </a:p>
-          <a:p>
+              <a:t>Renseigner ses </a:t>
+            </a:r>
             <a:r>
               <a:rPr lang="fr-FR" sz="2400" dirty="0" smtClean="0"/>
-              <a:t>Prévenir de son arrivée</a:t>
-            </a:r>
+              <a:t>informations</a:t>
+            </a:r>
+          </a:p>
+          <a:p>
+            <a:pPr lvl="1"/>
+            <a:r>
+              <a:rPr lang="fr-FR" sz="2200" i="1" dirty="0" smtClean="0"/>
+              <a:t>Nom, prénom, société</a:t>
+            </a:r>
+            <a:endParaRPr lang="fr-FR" sz="2200" i="1" dirty="0" smtClean="0"/>
           </a:p>
           <a:p>
             <a:r>
               <a:rPr lang="fr-FR" sz="2400" dirty="0" smtClean="0"/>
-              <a:t>Prévenir de son départ</a:t>
-            </a:r>
-          </a:p>
-          <a:p>
+              <a:t>Prévenir de son </a:t>
+            </a:r>
             <a:r>
               <a:rPr lang="fr-FR" sz="2400" dirty="0" smtClean="0"/>
-              <a:t>Contacter un employé</a:t>
-            </a:r>
+              <a:t>arrivée</a:t>
+            </a:r>
+          </a:p>
+          <a:p>
+            <a:pPr lvl="1"/>
+            <a:r>
+              <a:rPr lang="fr-FR" sz="2200" i="1" dirty="0" smtClean="0"/>
+              <a:t>Heure arrivée</a:t>
+            </a:r>
+            <a:endParaRPr lang="fr-FR" sz="2200" i="1" dirty="0" smtClean="0"/>
+          </a:p>
+          <a:p>
+            <a:r>
+              <a:rPr lang="fr-FR" sz="2400" dirty="0" smtClean="0"/>
+              <a:t>Prévenir de son </a:t>
+            </a:r>
+            <a:r>
+              <a:rPr lang="fr-FR" sz="2400" dirty="0" smtClean="0"/>
+              <a:t>départ</a:t>
+            </a:r>
+          </a:p>
+          <a:p>
+            <a:pPr lvl="1"/>
+            <a:r>
+              <a:rPr lang="fr-FR" sz="2200" i="1" dirty="0" smtClean="0"/>
+              <a:t>Heure départ</a:t>
+            </a:r>
+            <a:endParaRPr lang="fr-FR" sz="2200" i="1" dirty="0" smtClean="0"/>
+          </a:p>
+          <a:p>
+            <a:r>
+              <a:rPr lang="fr-FR" sz="2400" dirty="0" smtClean="0"/>
+              <a:t>Contacter </a:t>
+            </a:r>
+            <a:r>
+              <a:rPr lang="fr-FR" sz="2400" dirty="0" smtClean="0"/>
+              <a:t>un/des employés</a:t>
+            </a:r>
+          </a:p>
+          <a:p>
+            <a:pPr lvl="1"/>
+            <a:r>
+              <a:rPr lang="fr-FR" sz="2200" i="1" dirty="0" smtClean="0"/>
+              <a:t>Contacts</a:t>
+            </a:r>
+            <a:endParaRPr lang="fr-FR" sz="2200" i="1" dirty="0" smtClean="0"/>
           </a:p>
           <a:p>
             <a:r>
@@ -9664,7 +9861,973 @@
   <p:timing>
     <p:tnLst>
       <p:par>
-        <p:cTn id="1" dur="indefinite" restart="never" nodeType="tmRoot"/>
+        <p:cTn id="1" dur="indefinite" restart="never" nodeType="tmRoot">
+          <p:childTnLst>
+            <p:seq concurrent="1" nextAc="seek">
+              <p:cTn id="2" dur="indefinite" nodeType="mainSeq">
+                <p:childTnLst>
+                  <p:par>
+                    <p:cTn id="3" fill="hold">
+                      <p:stCondLst>
+                        <p:cond delay="indefinite"/>
+                        <p:cond evt="onBegin" delay="0">
+                          <p:tn val="2"/>
+                        </p:cond>
+                      </p:stCondLst>
+                      <p:childTnLst>
+                        <p:par>
+                          <p:cTn id="4" fill="hold">
+                            <p:stCondLst>
+                              <p:cond delay="0"/>
+                            </p:stCondLst>
+                            <p:childTnLst>
+                              <p:par>
+                                <p:cTn id="5" presetID="2" presetClass="entr" presetSubtype="2" fill="hold" nodeType="withEffect">
+                                  <p:stCondLst>
+                                    <p:cond delay="0"/>
+                                  </p:stCondLst>
+                                  <p:childTnLst>
+                                    <p:set>
+                                      <p:cBhvr>
+                                        <p:cTn id="6" dur="1" fill="hold">
+                                          <p:stCondLst>
+                                            <p:cond delay="0"/>
+                                          </p:stCondLst>
+                                        </p:cTn>
+                                        <p:tgtEl>
+                                          <p:spTgt spid="3">
+                                            <p:txEl>
+                                              <p:pRg st="0" end="0"/>
+                                            </p:txEl>
+                                          </p:spTgt>
+                                        </p:tgtEl>
+                                        <p:attrNameLst>
+                                          <p:attrName>style.visibility</p:attrName>
+                                        </p:attrNameLst>
+                                      </p:cBhvr>
+                                      <p:to>
+                                        <p:strVal val="visible"/>
+                                      </p:to>
+                                    </p:set>
+                                    <p:anim calcmode="lin" valueType="num">
+                                      <p:cBhvr additive="base">
+                                        <p:cTn id="7" dur="500" fill="hold"/>
+                                        <p:tgtEl>
+                                          <p:spTgt spid="3">
+                                            <p:txEl>
+                                              <p:pRg st="0" end="0"/>
+                                            </p:txEl>
+                                          </p:spTgt>
+                                        </p:tgtEl>
+                                        <p:attrNameLst>
+                                          <p:attrName>ppt_x</p:attrName>
+                                        </p:attrNameLst>
+                                      </p:cBhvr>
+                                      <p:tavLst>
+                                        <p:tav tm="0">
+                                          <p:val>
+                                            <p:strVal val="1+#ppt_w/2"/>
+                                          </p:val>
+                                        </p:tav>
+                                        <p:tav tm="100000">
+                                          <p:val>
+                                            <p:strVal val="#ppt_x"/>
+                                          </p:val>
+                                        </p:tav>
+                                      </p:tavLst>
+                                    </p:anim>
+                                    <p:anim calcmode="lin" valueType="num">
+                                      <p:cBhvr additive="base">
+                                        <p:cTn id="8" dur="500" fill="hold"/>
+                                        <p:tgtEl>
+                                          <p:spTgt spid="3">
+                                            <p:txEl>
+                                              <p:pRg st="0" end="0"/>
+                                            </p:txEl>
+                                          </p:spTgt>
+                                        </p:tgtEl>
+                                        <p:attrNameLst>
+                                          <p:attrName>ppt_y</p:attrName>
+                                        </p:attrNameLst>
+                                      </p:cBhvr>
+                                      <p:tavLst>
+                                        <p:tav tm="0">
+                                          <p:val>
+                                            <p:strVal val="#ppt_y"/>
+                                          </p:val>
+                                        </p:tav>
+                                        <p:tav tm="100000">
+                                          <p:val>
+                                            <p:strVal val="#ppt_y"/>
+                                          </p:val>
+                                        </p:tav>
+                                      </p:tavLst>
+                                    </p:anim>
+                                  </p:childTnLst>
+                                </p:cTn>
+                              </p:par>
+                              <p:par>
+                                <p:cTn id="9" presetID="2" presetClass="entr" presetSubtype="2" fill="hold" nodeType="withEffect">
+                                  <p:stCondLst>
+                                    <p:cond delay="0"/>
+                                  </p:stCondLst>
+                                  <p:childTnLst>
+                                    <p:set>
+                                      <p:cBhvr>
+                                        <p:cTn id="10" dur="1" fill="hold">
+                                          <p:stCondLst>
+                                            <p:cond delay="0"/>
+                                          </p:stCondLst>
+                                        </p:cTn>
+                                        <p:tgtEl>
+                                          <p:spTgt spid="3">
+                                            <p:txEl>
+                                              <p:pRg st="1" end="1"/>
+                                            </p:txEl>
+                                          </p:spTgt>
+                                        </p:tgtEl>
+                                        <p:attrNameLst>
+                                          <p:attrName>style.visibility</p:attrName>
+                                        </p:attrNameLst>
+                                      </p:cBhvr>
+                                      <p:to>
+                                        <p:strVal val="visible"/>
+                                      </p:to>
+                                    </p:set>
+                                    <p:anim calcmode="lin" valueType="num">
+                                      <p:cBhvr additive="base">
+                                        <p:cTn id="11" dur="500" fill="hold"/>
+                                        <p:tgtEl>
+                                          <p:spTgt spid="3">
+                                            <p:txEl>
+                                              <p:pRg st="1" end="1"/>
+                                            </p:txEl>
+                                          </p:spTgt>
+                                        </p:tgtEl>
+                                        <p:attrNameLst>
+                                          <p:attrName>ppt_x</p:attrName>
+                                        </p:attrNameLst>
+                                      </p:cBhvr>
+                                      <p:tavLst>
+                                        <p:tav tm="0">
+                                          <p:val>
+                                            <p:strVal val="1+#ppt_w/2"/>
+                                          </p:val>
+                                        </p:tav>
+                                        <p:tav tm="100000">
+                                          <p:val>
+                                            <p:strVal val="#ppt_x"/>
+                                          </p:val>
+                                        </p:tav>
+                                      </p:tavLst>
+                                    </p:anim>
+                                    <p:anim calcmode="lin" valueType="num">
+                                      <p:cBhvr additive="base">
+                                        <p:cTn id="12" dur="500" fill="hold"/>
+                                        <p:tgtEl>
+                                          <p:spTgt spid="3">
+                                            <p:txEl>
+                                              <p:pRg st="1" end="1"/>
+                                            </p:txEl>
+                                          </p:spTgt>
+                                        </p:tgtEl>
+                                        <p:attrNameLst>
+                                          <p:attrName>ppt_y</p:attrName>
+                                        </p:attrNameLst>
+                                      </p:cBhvr>
+                                      <p:tavLst>
+                                        <p:tav tm="0">
+                                          <p:val>
+                                            <p:strVal val="#ppt_y"/>
+                                          </p:val>
+                                        </p:tav>
+                                        <p:tav tm="100000">
+                                          <p:val>
+                                            <p:strVal val="#ppt_y"/>
+                                          </p:val>
+                                        </p:tav>
+                                      </p:tavLst>
+                                    </p:anim>
+                                  </p:childTnLst>
+                                </p:cTn>
+                              </p:par>
+                            </p:childTnLst>
+                          </p:cTn>
+                        </p:par>
+                      </p:childTnLst>
+                    </p:cTn>
+                  </p:par>
+                  <p:par>
+                    <p:cTn id="13" fill="hold">
+                      <p:stCondLst>
+                        <p:cond delay="indefinite"/>
+                      </p:stCondLst>
+                      <p:childTnLst>
+                        <p:par>
+                          <p:cTn id="14" fill="hold">
+                            <p:stCondLst>
+                              <p:cond delay="0"/>
+                            </p:stCondLst>
+                            <p:childTnLst>
+                              <p:par>
+                                <p:cTn id="15" presetID="2" presetClass="entr" presetSubtype="2" fill="hold" nodeType="clickEffect">
+                                  <p:stCondLst>
+                                    <p:cond delay="0"/>
+                                  </p:stCondLst>
+                                  <p:childTnLst>
+                                    <p:set>
+                                      <p:cBhvr>
+                                        <p:cTn id="16" dur="1" fill="hold">
+                                          <p:stCondLst>
+                                            <p:cond delay="0"/>
+                                          </p:stCondLst>
+                                        </p:cTn>
+                                        <p:tgtEl>
+                                          <p:spTgt spid="3">
+                                            <p:txEl>
+                                              <p:pRg st="2" end="2"/>
+                                            </p:txEl>
+                                          </p:spTgt>
+                                        </p:tgtEl>
+                                        <p:attrNameLst>
+                                          <p:attrName>style.visibility</p:attrName>
+                                        </p:attrNameLst>
+                                      </p:cBhvr>
+                                      <p:to>
+                                        <p:strVal val="visible"/>
+                                      </p:to>
+                                    </p:set>
+                                    <p:anim calcmode="lin" valueType="num">
+                                      <p:cBhvr additive="base">
+                                        <p:cTn id="17" dur="500" fill="hold"/>
+                                        <p:tgtEl>
+                                          <p:spTgt spid="3">
+                                            <p:txEl>
+                                              <p:pRg st="2" end="2"/>
+                                            </p:txEl>
+                                          </p:spTgt>
+                                        </p:tgtEl>
+                                        <p:attrNameLst>
+                                          <p:attrName>ppt_x</p:attrName>
+                                        </p:attrNameLst>
+                                      </p:cBhvr>
+                                      <p:tavLst>
+                                        <p:tav tm="0">
+                                          <p:val>
+                                            <p:strVal val="1+#ppt_w/2"/>
+                                          </p:val>
+                                        </p:tav>
+                                        <p:tav tm="100000">
+                                          <p:val>
+                                            <p:strVal val="#ppt_x"/>
+                                          </p:val>
+                                        </p:tav>
+                                      </p:tavLst>
+                                    </p:anim>
+                                    <p:anim calcmode="lin" valueType="num">
+                                      <p:cBhvr additive="base">
+                                        <p:cTn id="18" dur="500" fill="hold"/>
+                                        <p:tgtEl>
+                                          <p:spTgt spid="3">
+                                            <p:txEl>
+                                              <p:pRg st="2" end="2"/>
+                                            </p:txEl>
+                                          </p:spTgt>
+                                        </p:tgtEl>
+                                        <p:attrNameLst>
+                                          <p:attrName>ppt_y</p:attrName>
+                                        </p:attrNameLst>
+                                      </p:cBhvr>
+                                      <p:tavLst>
+                                        <p:tav tm="0">
+                                          <p:val>
+                                            <p:strVal val="#ppt_y"/>
+                                          </p:val>
+                                        </p:tav>
+                                        <p:tav tm="100000">
+                                          <p:val>
+                                            <p:strVal val="#ppt_y"/>
+                                          </p:val>
+                                        </p:tav>
+                                      </p:tavLst>
+                                    </p:anim>
+                                  </p:childTnLst>
+                                </p:cTn>
+                              </p:par>
+                              <p:par>
+                                <p:cTn id="19" presetID="2" presetClass="entr" presetSubtype="2" fill="hold" nodeType="withEffect">
+                                  <p:stCondLst>
+                                    <p:cond delay="0"/>
+                                  </p:stCondLst>
+                                  <p:childTnLst>
+                                    <p:set>
+                                      <p:cBhvr>
+                                        <p:cTn id="20" dur="1" fill="hold">
+                                          <p:stCondLst>
+                                            <p:cond delay="0"/>
+                                          </p:stCondLst>
+                                        </p:cTn>
+                                        <p:tgtEl>
+                                          <p:spTgt spid="3">
+                                            <p:txEl>
+                                              <p:pRg st="3" end="3"/>
+                                            </p:txEl>
+                                          </p:spTgt>
+                                        </p:tgtEl>
+                                        <p:attrNameLst>
+                                          <p:attrName>style.visibility</p:attrName>
+                                        </p:attrNameLst>
+                                      </p:cBhvr>
+                                      <p:to>
+                                        <p:strVal val="visible"/>
+                                      </p:to>
+                                    </p:set>
+                                    <p:anim calcmode="lin" valueType="num">
+                                      <p:cBhvr additive="base">
+                                        <p:cTn id="21" dur="500" fill="hold"/>
+                                        <p:tgtEl>
+                                          <p:spTgt spid="3">
+                                            <p:txEl>
+                                              <p:pRg st="3" end="3"/>
+                                            </p:txEl>
+                                          </p:spTgt>
+                                        </p:tgtEl>
+                                        <p:attrNameLst>
+                                          <p:attrName>ppt_x</p:attrName>
+                                        </p:attrNameLst>
+                                      </p:cBhvr>
+                                      <p:tavLst>
+                                        <p:tav tm="0">
+                                          <p:val>
+                                            <p:strVal val="1+#ppt_w/2"/>
+                                          </p:val>
+                                        </p:tav>
+                                        <p:tav tm="100000">
+                                          <p:val>
+                                            <p:strVal val="#ppt_x"/>
+                                          </p:val>
+                                        </p:tav>
+                                      </p:tavLst>
+                                    </p:anim>
+                                    <p:anim calcmode="lin" valueType="num">
+                                      <p:cBhvr additive="base">
+                                        <p:cTn id="22" dur="500" fill="hold"/>
+                                        <p:tgtEl>
+                                          <p:spTgt spid="3">
+                                            <p:txEl>
+                                              <p:pRg st="3" end="3"/>
+                                            </p:txEl>
+                                          </p:spTgt>
+                                        </p:tgtEl>
+                                        <p:attrNameLst>
+                                          <p:attrName>ppt_y</p:attrName>
+                                        </p:attrNameLst>
+                                      </p:cBhvr>
+                                      <p:tavLst>
+                                        <p:tav tm="0">
+                                          <p:val>
+                                            <p:strVal val="#ppt_y"/>
+                                          </p:val>
+                                        </p:tav>
+                                        <p:tav tm="100000">
+                                          <p:val>
+                                            <p:strVal val="#ppt_y"/>
+                                          </p:val>
+                                        </p:tav>
+                                      </p:tavLst>
+                                    </p:anim>
+                                  </p:childTnLst>
+                                </p:cTn>
+                              </p:par>
+                            </p:childTnLst>
+                          </p:cTn>
+                        </p:par>
+                      </p:childTnLst>
+                    </p:cTn>
+                  </p:par>
+                  <p:par>
+                    <p:cTn id="23" fill="hold">
+                      <p:stCondLst>
+                        <p:cond delay="indefinite"/>
+                      </p:stCondLst>
+                      <p:childTnLst>
+                        <p:par>
+                          <p:cTn id="24" fill="hold">
+                            <p:stCondLst>
+                              <p:cond delay="0"/>
+                            </p:stCondLst>
+                            <p:childTnLst>
+                              <p:par>
+                                <p:cTn id="25" presetID="2" presetClass="entr" presetSubtype="2" fill="hold" nodeType="clickEffect">
+                                  <p:stCondLst>
+                                    <p:cond delay="0"/>
+                                  </p:stCondLst>
+                                  <p:childTnLst>
+                                    <p:set>
+                                      <p:cBhvr>
+                                        <p:cTn id="26" dur="1" fill="hold">
+                                          <p:stCondLst>
+                                            <p:cond delay="0"/>
+                                          </p:stCondLst>
+                                        </p:cTn>
+                                        <p:tgtEl>
+                                          <p:spTgt spid="3">
+                                            <p:txEl>
+                                              <p:pRg st="4" end="4"/>
+                                            </p:txEl>
+                                          </p:spTgt>
+                                        </p:tgtEl>
+                                        <p:attrNameLst>
+                                          <p:attrName>style.visibility</p:attrName>
+                                        </p:attrNameLst>
+                                      </p:cBhvr>
+                                      <p:to>
+                                        <p:strVal val="visible"/>
+                                      </p:to>
+                                    </p:set>
+                                    <p:anim calcmode="lin" valueType="num">
+                                      <p:cBhvr additive="base">
+                                        <p:cTn id="27" dur="500" fill="hold"/>
+                                        <p:tgtEl>
+                                          <p:spTgt spid="3">
+                                            <p:txEl>
+                                              <p:pRg st="4" end="4"/>
+                                            </p:txEl>
+                                          </p:spTgt>
+                                        </p:tgtEl>
+                                        <p:attrNameLst>
+                                          <p:attrName>ppt_x</p:attrName>
+                                        </p:attrNameLst>
+                                      </p:cBhvr>
+                                      <p:tavLst>
+                                        <p:tav tm="0">
+                                          <p:val>
+                                            <p:strVal val="1+#ppt_w/2"/>
+                                          </p:val>
+                                        </p:tav>
+                                        <p:tav tm="100000">
+                                          <p:val>
+                                            <p:strVal val="#ppt_x"/>
+                                          </p:val>
+                                        </p:tav>
+                                      </p:tavLst>
+                                    </p:anim>
+                                    <p:anim calcmode="lin" valueType="num">
+                                      <p:cBhvr additive="base">
+                                        <p:cTn id="28" dur="500" fill="hold"/>
+                                        <p:tgtEl>
+                                          <p:spTgt spid="3">
+                                            <p:txEl>
+                                              <p:pRg st="4" end="4"/>
+                                            </p:txEl>
+                                          </p:spTgt>
+                                        </p:tgtEl>
+                                        <p:attrNameLst>
+                                          <p:attrName>ppt_y</p:attrName>
+                                        </p:attrNameLst>
+                                      </p:cBhvr>
+                                      <p:tavLst>
+                                        <p:tav tm="0">
+                                          <p:val>
+                                            <p:strVal val="#ppt_y"/>
+                                          </p:val>
+                                        </p:tav>
+                                        <p:tav tm="100000">
+                                          <p:val>
+                                            <p:strVal val="#ppt_y"/>
+                                          </p:val>
+                                        </p:tav>
+                                      </p:tavLst>
+                                    </p:anim>
+                                  </p:childTnLst>
+                                </p:cTn>
+                              </p:par>
+                              <p:par>
+                                <p:cTn id="29" presetID="2" presetClass="entr" presetSubtype="2" fill="hold" nodeType="withEffect">
+                                  <p:stCondLst>
+                                    <p:cond delay="0"/>
+                                  </p:stCondLst>
+                                  <p:childTnLst>
+                                    <p:set>
+                                      <p:cBhvr>
+                                        <p:cTn id="30" dur="1" fill="hold">
+                                          <p:stCondLst>
+                                            <p:cond delay="0"/>
+                                          </p:stCondLst>
+                                        </p:cTn>
+                                        <p:tgtEl>
+                                          <p:spTgt spid="3">
+                                            <p:txEl>
+                                              <p:pRg st="5" end="5"/>
+                                            </p:txEl>
+                                          </p:spTgt>
+                                        </p:tgtEl>
+                                        <p:attrNameLst>
+                                          <p:attrName>style.visibility</p:attrName>
+                                        </p:attrNameLst>
+                                      </p:cBhvr>
+                                      <p:to>
+                                        <p:strVal val="visible"/>
+                                      </p:to>
+                                    </p:set>
+                                    <p:anim calcmode="lin" valueType="num">
+                                      <p:cBhvr additive="base">
+                                        <p:cTn id="31" dur="500" fill="hold"/>
+                                        <p:tgtEl>
+                                          <p:spTgt spid="3">
+                                            <p:txEl>
+                                              <p:pRg st="5" end="5"/>
+                                            </p:txEl>
+                                          </p:spTgt>
+                                        </p:tgtEl>
+                                        <p:attrNameLst>
+                                          <p:attrName>ppt_x</p:attrName>
+                                        </p:attrNameLst>
+                                      </p:cBhvr>
+                                      <p:tavLst>
+                                        <p:tav tm="0">
+                                          <p:val>
+                                            <p:strVal val="1+#ppt_w/2"/>
+                                          </p:val>
+                                        </p:tav>
+                                        <p:tav tm="100000">
+                                          <p:val>
+                                            <p:strVal val="#ppt_x"/>
+                                          </p:val>
+                                        </p:tav>
+                                      </p:tavLst>
+                                    </p:anim>
+                                    <p:anim calcmode="lin" valueType="num">
+                                      <p:cBhvr additive="base">
+                                        <p:cTn id="32" dur="500" fill="hold"/>
+                                        <p:tgtEl>
+                                          <p:spTgt spid="3">
+                                            <p:txEl>
+                                              <p:pRg st="5" end="5"/>
+                                            </p:txEl>
+                                          </p:spTgt>
+                                        </p:tgtEl>
+                                        <p:attrNameLst>
+                                          <p:attrName>ppt_y</p:attrName>
+                                        </p:attrNameLst>
+                                      </p:cBhvr>
+                                      <p:tavLst>
+                                        <p:tav tm="0">
+                                          <p:val>
+                                            <p:strVal val="#ppt_y"/>
+                                          </p:val>
+                                        </p:tav>
+                                        <p:tav tm="100000">
+                                          <p:val>
+                                            <p:strVal val="#ppt_y"/>
+                                          </p:val>
+                                        </p:tav>
+                                      </p:tavLst>
+                                    </p:anim>
+                                  </p:childTnLst>
+                                </p:cTn>
+                              </p:par>
+                            </p:childTnLst>
+                          </p:cTn>
+                        </p:par>
+                      </p:childTnLst>
+                    </p:cTn>
+                  </p:par>
+                  <p:par>
+                    <p:cTn id="33" fill="hold">
+                      <p:stCondLst>
+                        <p:cond delay="indefinite"/>
+                      </p:stCondLst>
+                      <p:childTnLst>
+                        <p:par>
+                          <p:cTn id="34" fill="hold">
+                            <p:stCondLst>
+                              <p:cond delay="0"/>
+                            </p:stCondLst>
+                            <p:childTnLst>
+                              <p:par>
+                                <p:cTn id="35" presetID="2" presetClass="entr" presetSubtype="2" fill="hold" nodeType="clickEffect">
+                                  <p:stCondLst>
+                                    <p:cond delay="0"/>
+                                  </p:stCondLst>
+                                  <p:childTnLst>
+                                    <p:set>
+                                      <p:cBhvr>
+                                        <p:cTn id="36" dur="1" fill="hold">
+                                          <p:stCondLst>
+                                            <p:cond delay="0"/>
+                                          </p:stCondLst>
+                                        </p:cTn>
+                                        <p:tgtEl>
+                                          <p:spTgt spid="3">
+                                            <p:txEl>
+                                              <p:pRg st="6" end="6"/>
+                                            </p:txEl>
+                                          </p:spTgt>
+                                        </p:tgtEl>
+                                        <p:attrNameLst>
+                                          <p:attrName>style.visibility</p:attrName>
+                                        </p:attrNameLst>
+                                      </p:cBhvr>
+                                      <p:to>
+                                        <p:strVal val="visible"/>
+                                      </p:to>
+                                    </p:set>
+                                    <p:anim calcmode="lin" valueType="num">
+                                      <p:cBhvr additive="base">
+                                        <p:cTn id="37" dur="500" fill="hold"/>
+                                        <p:tgtEl>
+                                          <p:spTgt spid="3">
+                                            <p:txEl>
+                                              <p:pRg st="6" end="6"/>
+                                            </p:txEl>
+                                          </p:spTgt>
+                                        </p:tgtEl>
+                                        <p:attrNameLst>
+                                          <p:attrName>ppt_x</p:attrName>
+                                        </p:attrNameLst>
+                                      </p:cBhvr>
+                                      <p:tavLst>
+                                        <p:tav tm="0">
+                                          <p:val>
+                                            <p:strVal val="1+#ppt_w/2"/>
+                                          </p:val>
+                                        </p:tav>
+                                        <p:tav tm="100000">
+                                          <p:val>
+                                            <p:strVal val="#ppt_x"/>
+                                          </p:val>
+                                        </p:tav>
+                                      </p:tavLst>
+                                    </p:anim>
+                                    <p:anim calcmode="lin" valueType="num">
+                                      <p:cBhvr additive="base">
+                                        <p:cTn id="38" dur="500" fill="hold"/>
+                                        <p:tgtEl>
+                                          <p:spTgt spid="3">
+                                            <p:txEl>
+                                              <p:pRg st="6" end="6"/>
+                                            </p:txEl>
+                                          </p:spTgt>
+                                        </p:tgtEl>
+                                        <p:attrNameLst>
+                                          <p:attrName>ppt_y</p:attrName>
+                                        </p:attrNameLst>
+                                      </p:cBhvr>
+                                      <p:tavLst>
+                                        <p:tav tm="0">
+                                          <p:val>
+                                            <p:strVal val="#ppt_y"/>
+                                          </p:val>
+                                        </p:tav>
+                                        <p:tav tm="100000">
+                                          <p:val>
+                                            <p:strVal val="#ppt_y"/>
+                                          </p:val>
+                                        </p:tav>
+                                      </p:tavLst>
+                                    </p:anim>
+                                  </p:childTnLst>
+                                </p:cTn>
+                              </p:par>
+                              <p:par>
+                                <p:cTn id="39" presetID="2" presetClass="entr" presetSubtype="2" fill="hold" nodeType="withEffect">
+                                  <p:stCondLst>
+                                    <p:cond delay="0"/>
+                                  </p:stCondLst>
+                                  <p:childTnLst>
+                                    <p:set>
+                                      <p:cBhvr>
+                                        <p:cTn id="40" dur="1" fill="hold">
+                                          <p:stCondLst>
+                                            <p:cond delay="0"/>
+                                          </p:stCondLst>
+                                        </p:cTn>
+                                        <p:tgtEl>
+                                          <p:spTgt spid="3">
+                                            <p:txEl>
+                                              <p:pRg st="7" end="7"/>
+                                            </p:txEl>
+                                          </p:spTgt>
+                                        </p:tgtEl>
+                                        <p:attrNameLst>
+                                          <p:attrName>style.visibility</p:attrName>
+                                        </p:attrNameLst>
+                                      </p:cBhvr>
+                                      <p:to>
+                                        <p:strVal val="visible"/>
+                                      </p:to>
+                                    </p:set>
+                                    <p:anim calcmode="lin" valueType="num">
+                                      <p:cBhvr additive="base">
+                                        <p:cTn id="41" dur="500" fill="hold"/>
+                                        <p:tgtEl>
+                                          <p:spTgt spid="3">
+                                            <p:txEl>
+                                              <p:pRg st="7" end="7"/>
+                                            </p:txEl>
+                                          </p:spTgt>
+                                        </p:tgtEl>
+                                        <p:attrNameLst>
+                                          <p:attrName>ppt_x</p:attrName>
+                                        </p:attrNameLst>
+                                      </p:cBhvr>
+                                      <p:tavLst>
+                                        <p:tav tm="0">
+                                          <p:val>
+                                            <p:strVal val="1+#ppt_w/2"/>
+                                          </p:val>
+                                        </p:tav>
+                                        <p:tav tm="100000">
+                                          <p:val>
+                                            <p:strVal val="#ppt_x"/>
+                                          </p:val>
+                                        </p:tav>
+                                      </p:tavLst>
+                                    </p:anim>
+                                    <p:anim calcmode="lin" valueType="num">
+                                      <p:cBhvr additive="base">
+                                        <p:cTn id="42" dur="500" fill="hold"/>
+                                        <p:tgtEl>
+                                          <p:spTgt spid="3">
+                                            <p:txEl>
+                                              <p:pRg st="7" end="7"/>
+                                            </p:txEl>
+                                          </p:spTgt>
+                                        </p:tgtEl>
+                                        <p:attrNameLst>
+                                          <p:attrName>ppt_y</p:attrName>
+                                        </p:attrNameLst>
+                                      </p:cBhvr>
+                                      <p:tavLst>
+                                        <p:tav tm="0">
+                                          <p:val>
+                                            <p:strVal val="#ppt_y"/>
+                                          </p:val>
+                                        </p:tav>
+                                        <p:tav tm="100000">
+                                          <p:val>
+                                            <p:strVal val="#ppt_y"/>
+                                          </p:val>
+                                        </p:tav>
+                                      </p:tavLst>
+                                    </p:anim>
+                                  </p:childTnLst>
+                                </p:cTn>
+                              </p:par>
+                            </p:childTnLst>
+                          </p:cTn>
+                        </p:par>
+                      </p:childTnLst>
+                    </p:cTn>
+                  </p:par>
+                  <p:par>
+                    <p:cTn id="43" fill="hold">
+                      <p:stCondLst>
+                        <p:cond delay="indefinite"/>
+                      </p:stCondLst>
+                      <p:childTnLst>
+                        <p:par>
+                          <p:cTn id="44" fill="hold">
+                            <p:stCondLst>
+                              <p:cond delay="0"/>
+                            </p:stCondLst>
+                            <p:childTnLst>
+                              <p:par>
+                                <p:cTn id="45" presetID="2" presetClass="entr" presetSubtype="2" fill="hold" nodeType="clickEffect">
+                                  <p:stCondLst>
+                                    <p:cond delay="0"/>
+                                  </p:stCondLst>
+                                  <p:childTnLst>
+                                    <p:set>
+                                      <p:cBhvr>
+                                        <p:cTn id="46" dur="1" fill="hold">
+                                          <p:stCondLst>
+                                            <p:cond delay="0"/>
+                                          </p:stCondLst>
+                                        </p:cTn>
+                                        <p:tgtEl>
+                                          <p:spTgt spid="3">
+                                            <p:txEl>
+                                              <p:pRg st="8" end="8"/>
+                                            </p:txEl>
+                                          </p:spTgt>
+                                        </p:tgtEl>
+                                        <p:attrNameLst>
+                                          <p:attrName>style.visibility</p:attrName>
+                                        </p:attrNameLst>
+                                      </p:cBhvr>
+                                      <p:to>
+                                        <p:strVal val="visible"/>
+                                      </p:to>
+                                    </p:set>
+                                    <p:anim calcmode="lin" valueType="num">
+                                      <p:cBhvr additive="base">
+                                        <p:cTn id="47" dur="500" fill="hold"/>
+                                        <p:tgtEl>
+                                          <p:spTgt spid="3">
+                                            <p:txEl>
+                                              <p:pRg st="8" end="8"/>
+                                            </p:txEl>
+                                          </p:spTgt>
+                                        </p:tgtEl>
+                                        <p:attrNameLst>
+                                          <p:attrName>ppt_x</p:attrName>
+                                        </p:attrNameLst>
+                                      </p:cBhvr>
+                                      <p:tavLst>
+                                        <p:tav tm="0">
+                                          <p:val>
+                                            <p:strVal val="1+#ppt_w/2"/>
+                                          </p:val>
+                                        </p:tav>
+                                        <p:tav tm="100000">
+                                          <p:val>
+                                            <p:strVal val="#ppt_x"/>
+                                          </p:val>
+                                        </p:tav>
+                                      </p:tavLst>
+                                    </p:anim>
+                                    <p:anim calcmode="lin" valueType="num">
+                                      <p:cBhvr additive="base">
+                                        <p:cTn id="48" dur="500" fill="hold"/>
+                                        <p:tgtEl>
+                                          <p:spTgt spid="3">
+                                            <p:txEl>
+                                              <p:pRg st="8" end="8"/>
+                                            </p:txEl>
+                                          </p:spTgt>
+                                        </p:tgtEl>
+                                        <p:attrNameLst>
+                                          <p:attrName>ppt_y</p:attrName>
+                                        </p:attrNameLst>
+                                      </p:cBhvr>
+                                      <p:tavLst>
+                                        <p:tav tm="0">
+                                          <p:val>
+                                            <p:strVal val="#ppt_y"/>
+                                          </p:val>
+                                        </p:tav>
+                                        <p:tav tm="100000">
+                                          <p:val>
+                                            <p:strVal val="#ppt_y"/>
+                                          </p:val>
+                                        </p:tav>
+                                      </p:tavLst>
+                                    </p:anim>
+                                  </p:childTnLst>
+                                </p:cTn>
+                              </p:par>
+                              <p:par>
+                                <p:cTn id="49" presetID="2" presetClass="entr" presetSubtype="2" fill="hold" nodeType="withEffect">
+                                  <p:stCondLst>
+                                    <p:cond delay="0"/>
+                                  </p:stCondLst>
+                                  <p:childTnLst>
+                                    <p:set>
+                                      <p:cBhvr>
+                                        <p:cTn id="50" dur="1" fill="hold">
+                                          <p:stCondLst>
+                                            <p:cond delay="0"/>
+                                          </p:stCondLst>
+                                        </p:cTn>
+                                        <p:tgtEl>
+                                          <p:spTgt spid="3">
+                                            <p:txEl>
+                                              <p:pRg st="9" end="9"/>
+                                            </p:txEl>
+                                          </p:spTgt>
+                                        </p:tgtEl>
+                                        <p:attrNameLst>
+                                          <p:attrName>style.visibility</p:attrName>
+                                        </p:attrNameLst>
+                                      </p:cBhvr>
+                                      <p:to>
+                                        <p:strVal val="visible"/>
+                                      </p:to>
+                                    </p:set>
+                                    <p:anim calcmode="lin" valueType="num">
+                                      <p:cBhvr additive="base">
+                                        <p:cTn id="51" dur="500" fill="hold"/>
+                                        <p:tgtEl>
+                                          <p:spTgt spid="3">
+                                            <p:txEl>
+                                              <p:pRg st="9" end="9"/>
+                                            </p:txEl>
+                                          </p:spTgt>
+                                        </p:tgtEl>
+                                        <p:attrNameLst>
+                                          <p:attrName>ppt_x</p:attrName>
+                                        </p:attrNameLst>
+                                      </p:cBhvr>
+                                      <p:tavLst>
+                                        <p:tav tm="0">
+                                          <p:val>
+                                            <p:strVal val="1+#ppt_w/2"/>
+                                          </p:val>
+                                        </p:tav>
+                                        <p:tav tm="100000">
+                                          <p:val>
+                                            <p:strVal val="#ppt_x"/>
+                                          </p:val>
+                                        </p:tav>
+                                      </p:tavLst>
+                                    </p:anim>
+                                    <p:anim calcmode="lin" valueType="num">
+                                      <p:cBhvr additive="base">
+                                        <p:cTn id="52" dur="500" fill="hold"/>
+                                        <p:tgtEl>
+                                          <p:spTgt spid="3">
+                                            <p:txEl>
+                                              <p:pRg st="9" end="9"/>
+                                            </p:txEl>
+                                          </p:spTgt>
+                                        </p:tgtEl>
+                                        <p:attrNameLst>
+                                          <p:attrName>ppt_y</p:attrName>
+                                        </p:attrNameLst>
+                                      </p:cBhvr>
+                                      <p:tavLst>
+                                        <p:tav tm="0">
+                                          <p:val>
+                                            <p:strVal val="#ppt_y"/>
+                                          </p:val>
+                                        </p:tav>
+                                        <p:tav tm="100000">
+                                          <p:val>
+                                            <p:strVal val="#ppt_y"/>
+                                          </p:val>
+                                        </p:tav>
+                                      </p:tavLst>
+                                    </p:anim>
+                                  </p:childTnLst>
+                                </p:cTn>
+                              </p:par>
+                            </p:childTnLst>
+                          </p:cTn>
+                        </p:par>
+                      </p:childTnLst>
+                    </p:cTn>
+                  </p:par>
+                </p:childTnLst>
+              </p:cTn>
+              <p:prevCondLst>
+                <p:cond evt="onPrev" delay="0">
+                  <p:tgtEl>
+                    <p:sldTgt/>
+                  </p:tgtEl>
+                </p:cond>
+              </p:prevCondLst>
+              <p:nextCondLst>
+                <p:cond evt="onNext" delay="0">
+                  <p:tgtEl>
+                    <p:sldTgt/>
+                  </p:tgtEl>
+                </p:cond>
+              </p:nextCondLst>
+            </p:seq>
+          </p:childTnLst>
+        </p:cTn>
       </p:par>
     </p:tnLst>
   </p:timing>
@@ -9885,50 +11048,54 @@
           <a:lstStyle/>
           <a:p>
             <a:r>
-              <a:rPr lang="fr-FR" dirty="0" smtClean="0"/>
+              <a:rPr lang="fr-FR" sz="2400" dirty="0" smtClean="0"/>
               <a:t>Application native (Objective C / Android / WPF)</a:t>
             </a:r>
           </a:p>
           <a:p>
-            <a:endParaRPr lang="fr-FR" dirty="0" smtClean="0"/>
-          </a:p>
-          <a:p>
-            <a:r>
-              <a:rPr lang="fr-FR" dirty="0" smtClean="0"/>
+            <a:endParaRPr lang="fr-FR" sz="2400" dirty="0" smtClean="0"/>
+          </a:p>
+          <a:p>
+            <a:r>
+              <a:rPr lang="fr-FR" sz="2400" dirty="0" smtClean="0"/>
               <a:t>Application hybride (</a:t>
             </a:r>
             <a:r>
-              <a:rPr lang="fr-FR" dirty="0" err="1" smtClean="0"/>
+              <a:rPr lang="fr-FR" sz="2400" dirty="0" err="1" smtClean="0"/>
               <a:t>Titanium</a:t>
             </a:r>
             <a:r>
-              <a:rPr lang="fr-FR" dirty="0" smtClean="0"/>
+              <a:rPr lang="fr-FR" sz="2400" dirty="0" smtClean="0"/>
               <a:t> / </a:t>
             </a:r>
             <a:r>
-              <a:rPr lang="fr-FR" dirty="0" err="1" smtClean="0"/>
+              <a:rPr lang="fr-FR" sz="2400" dirty="0" err="1" smtClean="0"/>
               <a:t>PhoneGap</a:t>
             </a:r>
             <a:r>
-              <a:rPr lang="fr-FR" dirty="0" smtClean="0"/>
+              <a:rPr lang="fr-FR" sz="2400" dirty="0" smtClean="0"/>
               <a:t> </a:t>
             </a:r>
             <a:r>
-              <a:rPr lang="fr-FR" dirty="0" err="1" smtClean="0"/>
+              <a:rPr lang="fr-FR" sz="2400" dirty="0" err="1" smtClean="0"/>
               <a:t>Cordova</a:t>
+            </a:r>
+            <a:r>
+              <a:rPr lang="fr-FR" sz="2400" dirty="0" smtClean="0"/>
+              <a:t>)</a:t>
+            </a:r>
+          </a:p>
+          <a:p>
+            <a:endParaRPr lang="fr-FR" sz="2400" dirty="0" smtClean="0"/>
+          </a:p>
+          <a:p>
+            <a:r>
+              <a:rPr lang="fr-FR" sz="2400" dirty="0" smtClean="0"/>
+              <a:t>Application web (HTML5 / JavaScript / PHP</a:t>
             </a:r>
             <a:r>
               <a:rPr lang="fr-FR" dirty="0" smtClean="0"/>
               <a:t>)</a:t>
-            </a:r>
-          </a:p>
-          <a:p>
-            <a:endParaRPr lang="fr-FR" dirty="0" smtClean="0"/>
-          </a:p>
-          <a:p>
-            <a:r>
-              <a:rPr lang="fr-FR" dirty="0" smtClean="0"/>
-              <a:t>Application web (HTML5 / JavaScript / PHP)</a:t>
             </a:r>
           </a:p>
         </p:txBody>
@@ -10010,8 +11177,23 @@
           <a:p>
             <a:r>
               <a:rPr lang="fr-FR" dirty="0" smtClean="0"/>
-              <a:t>+ Ergonomie </a:t>
-            </a:r>
+              <a:t>+ </a:t>
+            </a:r>
+            <a:r>
+              <a:rPr lang="fr-FR" dirty="0" smtClean="0"/>
+              <a:t>Performance</a:t>
+            </a:r>
+          </a:p>
+          <a:p>
+            <a:r>
+              <a:rPr lang="fr-FR" dirty="0" smtClean="0"/>
+              <a:t>+ </a:t>
+            </a:r>
+            <a:r>
+              <a:rPr lang="fr-FR" dirty="0" smtClean="0"/>
+              <a:t>Ergonomie </a:t>
+            </a:r>
+            <a:endParaRPr lang="fr-FR" dirty="0" smtClean="0"/>
           </a:p>
           <a:p>
             <a:r>
@@ -10022,7 +11204,15 @@
           <a:p>
             <a:r>
               <a:rPr lang="fr-FR" dirty="0" smtClean="0"/>
-              <a:t>- Cout du développement </a:t>
+              <a:t>- </a:t>
+            </a:r>
+            <a:r>
+              <a:rPr lang="fr-FR" dirty="0" smtClean="0"/>
+              <a:t>Coût </a:t>
+            </a:r>
+            <a:r>
+              <a:rPr lang="fr-FR" dirty="0" smtClean="0"/>
+              <a:t>du développement </a:t>
             </a:r>
           </a:p>
           <a:p>
@@ -10034,7 +11224,11 @@
           <a:p>
             <a:r>
               <a:rPr lang="fr-FR" dirty="0" smtClean="0"/>
-              <a:t>- Licence obligatoire sur certaine plateforme</a:t>
+              <a:t>- Licence obligatoire sur </a:t>
+            </a:r>
+            <a:r>
+              <a:rPr lang="fr-FR" smtClean="0"/>
+              <a:t>iOs</a:t>
             </a:r>
             <a:endParaRPr lang="fr-FR" dirty="0"/>
           </a:p>
@@ -10163,7 +11357,579 @@
   <p:timing>
     <p:tnLst>
       <p:par>
-        <p:cTn id="1" dur="indefinite" restart="never" nodeType="tmRoot"/>
+        <p:cTn id="1" dur="indefinite" restart="never" nodeType="tmRoot">
+          <p:childTnLst>
+            <p:seq concurrent="1" nextAc="seek">
+              <p:cTn id="2" dur="indefinite" nodeType="mainSeq">
+                <p:childTnLst>
+                  <p:par>
+                    <p:cTn id="3" fill="hold">
+                      <p:stCondLst>
+                        <p:cond delay="indefinite"/>
+                        <p:cond evt="onBegin" delay="0">
+                          <p:tn val="2"/>
+                        </p:cond>
+                      </p:stCondLst>
+                      <p:childTnLst>
+                        <p:par>
+                          <p:cTn id="4" fill="hold">
+                            <p:stCondLst>
+                              <p:cond delay="0"/>
+                            </p:stCondLst>
+                            <p:childTnLst>
+                              <p:par>
+                                <p:cTn id="5" presetID="2" presetClass="entr" presetSubtype="2" fill="hold" nodeType="withEffect">
+                                  <p:stCondLst>
+                                    <p:cond delay="0"/>
+                                  </p:stCondLst>
+                                  <p:childTnLst>
+                                    <p:set>
+                                      <p:cBhvr>
+                                        <p:cTn id="6" dur="1" fill="hold">
+                                          <p:stCondLst>
+                                            <p:cond delay="0"/>
+                                          </p:stCondLst>
+                                        </p:cTn>
+                                        <p:tgtEl>
+                                          <p:spTgt spid="3">
+                                            <p:txEl>
+                                              <p:pRg st="0" end="0"/>
+                                            </p:txEl>
+                                          </p:spTgt>
+                                        </p:tgtEl>
+                                        <p:attrNameLst>
+                                          <p:attrName>style.visibility</p:attrName>
+                                        </p:attrNameLst>
+                                      </p:cBhvr>
+                                      <p:to>
+                                        <p:strVal val="visible"/>
+                                      </p:to>
+                                    </p:set>
+                                    <p:anim calcmode="lin" valueType="num">
+                                      <p:cBhvr additive="base">
+                                        <p:cTn id="7" dur="500" fill="hold"/>
+                                        <p:tgtEl>
+                                          <p:spTgt spid="3">
+                                            <p:txEl>
+                                              <p:pRg st="0" end="0"/>
+                                            </p:txEl>
+                                          </p:spTgt>
+                                        </p:tgtEl>
+                                        <p:attrNameLst>
+                                          <p:attrName>ppt_x</p:attrName>
+                                        </p:attrNameLst>
+                                      </p:cBhvr>
+                                      <p:tavLst>
+                                        <p:tav tm="0">
+                                          <p:val>
+                                            <p:strVal val="1+#ppt_w/2"/>
+                                          </p:val>
+                                        </p:tav>
+                                        <p:tav tm="100000">
+                                          <p:val>
+                                            <p:strVal val="#ppt_x"/>
+                                          </p:val>
+                                        </p:tav>
+                                      </p:tavLst>
+                                    </p:anim>
+                                    <p:anim calcmode="lin" valueType="num">
+                                      <p:cBhvr additive="base">
+                                        <p:cTn id="8" dur="500" fill="hold"/>
+                                        <p:tgtEl>
+                                          <p:spTgt spid="3">
+                                            <p:txEl>
+                                              <p:pRg st="0" end="0"/>
+                                            </p:txEl>
+                                          </p:spTgt>
+                                        </p:tgtEl>
+                                        <p:attrNameLst>
+                                          <p:attrName>ppt_y</p:attrName>
+                                        </p:attrNameLst>
+                                      </p:cBhvr>
+                                      <p:tavLst>
+                                        <p:tav tm="0">
+                                          <p:val>
+                                            <p:strVal val="#ppt_y"/>
+                                          </p:val>
+                                        </p:tav>
+                                        <p:tav tm="100000">
+                                          <p:val>
+                                            <p:strVal val="#ppt_y"/>
+                                          </p:val>
+                                        </p:tav>
+                                      </p:tavLst>
+                                    </p:anim>
+                                  </p:childTnLst>
+                                </p:cTn>
+                              </p:par>
+                              <p:par>
+                                <p:cTn id="9" presetID="2" presetClass="entr" presetSubtype="2" fill="hold" nodeType="withEffect">
+                                  <p:stCondLst>
+                                    <p:cond delay="0"/>
+                                  </p:stCondLst>
+                                  <p:childTnLst>
+                                    <p:set>
+                                      <p:cBhvr>
+                                        <p:cTn id="10" dur="1" fill="hold">
+                                          <p:stCondLst>
+                                            <p:cond delay="0"/>
+                                          </p:stCondLst>
+                                        </p:cTn>
+                                        <p:tgtEl>
+                                          <p:spTgt spid="3">
+                                            <p:txEl>
+                                              <p:pRg st="1" end="1"/>
+                                            </p:txEl>
+                                          </p:spTgt>
+                                        </p:tgtEl>
+                                        <p:attrNameLst>
+                                          <p:attrName>style.visibility</p:attrName>
+                                        </p:attrNameLst>
+                                      </p:cBhvr>
+                                      <p:to>
+                                        <p:strVal val="visible"/>
+                                      </p:to>
+                                    </p:set>
+                                    <p:anim calcmode="lin" valueType="num">
+                                      <p:cBhvr additive="base">
+                                        <p:cTn id="11" dur="500" fill="hold"/>
+                                        <p:tgtEl>
+                                          <p:spTgt spid="3">
+                                            <p:txEl>
+                                              <p:pRg st="1" end="1"/>
+                                            </p:txEl>
+                                          </p:spTgt>
+                                        </p:tgtEl>
+                                        <p:attrNameLst>
+                                          <p:attrName>ppt_x</p:attrName>
+                                        </p:attrNameLst>
+                                      </p:cBhvr>
+                                      <p:tavLst>
+                                        <p:tav tm="0">
+                                          <p:val>
+                                            <p:strVal val="1+#ppt_w/2"/>
+                                          </p:val>
+                                        </p:tav>
+                                        <p:tav tm="100000">
+                                          <p:val>
+                                            <p:strVal val="#ppt_x"/>
+                                          </p:val>
+                                        </p:tav>
+                                      </p:tavLst>
+                                    </p:anim>
+                                    <p:anim calcmode="lin" valueType="num">
+                                      <p:cBhvr additive="base">
+                                        <p:cTn id="12" dur="500" fill="hold"/>
+                                        <p:tgtEl>
+                                          <p:spTgt spid="3">
+                                            <p:txEl>
+                                              <p:pRg st="1" end="1"/>
+                                            </p:txEl>
+                                          </p:spTgt>
+                                        </p:tgtEl>
+                                        <p:attrNameLst>
+                                          <p:attrName>ppt_y</p:attrName>
+                                        </p:attrNameLst>
+                                      </p:cBhvr>
+                                      <p:tavLst>
+                                        <p:tav tm="0">
+                                          <p:val>
+                                            <p:strVal val="#ppt_y"/>
+                                          </p:val>
+                                        </p:tav>
+                                        <p:tav tm="100000">
+                                          <p:val>
+                                            <p:strVal val="#ppt_y"/>
+                                          </p:val>
+                                        </p:tav>
+                                      </p:tavLst>
+                                    </p:anim>
+                                  </p:childTnLst>
+                                </p:cTn>
+                              </p:par>
+                              <p:par>
+                                <p:cTn id="13" presetID="2" presetClass="entr" presetSubtype="2" fill="hold" nodeType="withEffect">
+                                  <p:stCondLst>
+                                    <p:cond delay="0"/>
+                                  </p:stCondLst>
+                                  <p:childTnLst>
+                                    <p:set>
+                                      <p:cBhvr>
+                                        <p:cTn id="14" dur="1" fill="hold">
+                                          <p:stCondLst>
+                                            <p:cond delay="0"/>
+                                          </p:stCondLst>
+                                        </p:cTn>
+                                        <p:tgtEl>
+                                          <p:spTgt spid="3">
+                                            <p:txEl>
+                                              <p:pRg st="2" end="2"/>
+                                            </p:txEl>
+                                          </p:spTgt>
+                                        </p:tgtEl>
+                                        <p:attrNameLst>
+                                          <p:attrName>style.visibility</p:attrName>
+                                        </p:attrNameLst>
+                                      </p:cBhvr>
+                                      <p:to>
+                                        <p:strVal val="visible"/>
+                                      </p:to>
+                                    </p:set>
+                                    <p:anim calcmode="lin" valueType="num">
+                                      <p:cBhvr additive="base">
+                                        <p:cTn id="15" dur="500" fill="hold"/>
+                                        <p:tgtEl>
+                                          <p:spTgt spid="3">
+                                            <p:txEl>
+                                              <p:pRg st="2" end="2"/>
+                                            </p:txEl>
+                                          </p:spTgt>
+                                        </p:tgtEl>
+                                        <p:attrNameLst>
+                                          <p:attrName>ppt_x</p:attrName>
+                                        </p:attrNameLst>
+                                      </p:cBhvr>
+                                      <p:tavLst>
+                                        <p:tav tm="0">
+                                          <p:val>
+                                            <p:strVal val="1+#ppt_w/2"/>
+                                          </p:val>
+                                        </p:tav>
+                                        <p:tav tm="100000">
+                                          <p:val>
+                                            <p:strVal val="#ppt_x"/>
+                                          </p:val>
+                                        </p:tav>
+                                      </p:tavLst>
+                                    </p:anim>
+                                    <p:anim calcmode="lin" valueType="num">
+                                      <p:cBhvr additive="base">
+                                        <p:cTn id="16" dur="500" fill="hold"/>
+                                        <p:tgtEl>
+                                          <p:spTgt spid="3">
+                                            <p:txEl>
+                                              <p:pRg st="2" end="2"/>
+                                            </p:txEl>
+                                          </p:spTgt>
+                                        </p:tgtEl>
+                                        <p:attrNameLst>
+                                          <p:attrName>ppt_y</p:attrName>
+                                        </p:attrNameLst>
+                                      </p:cBhvr>
+                                      <p:tavLst>
+                                        <p:tav tm="0">
+                                          <p:val>
+                                            <p:strVal val="#ppt_y"/>
+                                          </p:val>
+                                        </p:tav>
+                                        <p:tav tm="100000">
+                                          <p:val>
+                                            <p:strVal val="#ppt_y"/>
+                                          </p:val>
+                                        </p:tav>
+                                      </p:tavLst>
+                                    </p:anim>
+                                  </p:childTnLst>
+                                </p:cTn>
+                              </p:par>
+                            </p:childTnLst>
+                          </p:cTn>
+                        </p:par>
+                      </p:childTnLst>
+                    </p:cTn>
+                  </p:par>
+                  <p:par>
+                    <p:cTn id="17" fill="hold">
+                      <p:stCondLst>
+                        <p:cond delay="indefinite"/>
+                      </p:stCondLst>
+                      <p:childTnLst>
+                        <p:par>
+                          <p:cTn id="18" fill="hold">
+                            <p:stCondLst>
+                              <p:cond delay="0"/>
+                            </p:stCondLst>
+                            <p:childTnLst>
+                              <p:par>
+                                <p:cTn id="19" presetID="2" presetClass="entr" presetSubtype="2" fill="hold" nodeType="clickEffect">
+                                  <p:stCondLst>
+                                    <p:cond delay="0"/>
+                                  </p:stCondLst>
+                                  <p:childTnLst>
+                                    <p:set>
+                                      <p:cBhvr>
+                                        <p:cTn id="20" dur="1" fill="hold">
+                                          <p:stCondLst>
+                                            <p:cond delay="0"/>
+                                          </p:stCondLst>
+                                        </p:cTn>
+                                        <p:tgtEl>
+                                          <p:spTgt spid="3">
+                                            <p:txEl>
+                                              <p:pRg st="3" end="3"/>
+                                            </p:txEl>
+                                          </p:spTgt>
+                                        </p:tgtEl>
+                                        <p:attrNameLst>
+                                          <p:attrName>style.visibility</p:attrName>
+                                        </p:attrNameLst>
+                                      </p:cBhvr>
+                                      <p:to>
+                                        <p:strVal val="visible"/>
+                                      </p:to>
+                                    </p:set>
+                                    <p:anim calcmode="lin" valueType="num">
+                                      <p:cBhvr additive="base">
+                                        <p:cTn id="21" dur="500" fill="hold"/>
+                                        <p:tgtEl>
+                                          <p:spTgt spid="3">
+                                            <p:txEl>
+                                              <p:pRg st="3" end="3"/>
+                                            </p:txEl>
+                                          </p:spTgt>
+                                        </p:tgtEl>
+                                        <p:attrNameLst>
+                                          <p:attrName>ppt_x</p:attrName>
+                                        </p:attrNameLst>
+                                      </p:cBhvr>
+                                      <p:tavLst>
+                                        <p:tav tm="0">
+                                          <p:val>
+                                            <p:strVal val="1+#ppt_w/2"/>
+                                          </p:val>
+                                        </p:tav>
+                                        <p:tav tm="100000">
+                                          <p:val>
+                                            <p:strVal val="#ppt_x"/>
+                                          </p:val>
+                                        </p:tav>
+                                      </p:tavLst>
+                                    </p:anim>
+                                    <p:anim calcmode="lin" valueType="num">
+                                      <p:cBhvr additive="base">
+                                        <p:cTn id="22" dur="500" fill="hold"/>
+                                        <p:tgtEl>
+                                          <p:spTgt spid="3">
+                                            <p:txEl>
+                                              <p:pRg st="3" end="3"/>
+                                            </p:txEl>
+                                          </p:spTgt>
+                                        </p:tgtEl>
+                                        <p:attrNameLst>
+                                          <p:attrName>ppt_y</p:attrName>
+                                        </p:attrNameLst>
+                                      </p:cBhvr>
+                                      <p:tavLst>
+                                        <p:tav tm="0">
+                                          <p:val>
+                                            <p:strVal val="#ppt_y"/>
+                                          </p:val>
+                                        </p:tav>
+                                        <p:tav tm="100000">
+                                          <p:val>
+                                            <p:strVal val="#ppt_y"/>
+                                          </p:val>
+                                        </p:tav>
+                                      </p:tavLst>
+                                    </p:anim>
+                                  </p:childTnLst>
+                                </p:cTn>
+                              </p:par>
+                              <p:par>
+                                <p:cTn id="23" presetID="2" presetClass="entr" presetSubtype="2" fill="hold" nodeType="withEffect">
+                                  <p:stCondLst>
+                                    <p:cond delay="0"/>
+                                  </p:stCondLst>
+                                  <p:childTnLst>
+                                    <p:set>
+                                      <p:cBhvr>
+                                        <p:cTn id="24" dur="1" fill="hold">
+                                          <p:stCondLst>
+                                            <p:cond delay="0"/>
+                                          </p:stCondLst>
+                                        </p:cTn>
+                                        <p:tgtEl>
+                                          <p:spTgt spid="3">
+                                            <p:txEl>
+                                              <p:pRg st="4" end="4"/>
+                                            </p:txEl>
+                                          </p:spTgt>
+                                        </p:tgtEl>
+                                        <p:attrNameLst>
+                                          <p:attrName>style.visibility</p:attrName>
+                                        </p:attrNameLst>
+                                      </p:cBhvr>
+                                      <p:to>
+                                        <p:strVal val="visible"/>
+                                      </p:to>
+                                    </p:set>
+                                    <p:anim calcmode="lin" valueType="num">
+                                      <p:cBhvr additive="base">
+                                        <p:cTn id="25" dur="500" fill="hold"/>
+                                        <p:tgtEl>
+                                          <p:spTgt spid="3">
+                                            <p:txEl>
+                                              <p:pRg st="4" end="4"/>
+                                            </p:txEl>
+                                          </p:spTgt>
+                                        </p:tgtEl>
+                                        <p:attrNameLst>
+                                          <p:attrName>ppt_x</p:attrName>
+                                        </p:attrNameLst>
+                                      </p:cBhvr>
+                                      <p:tavLst>
+                                        <p:tav tm="0">
+                                          <p:val>
+                                            <p:strVal val="1+#ppt_w/2"/>
+                                          </p:val>
+                                        </p:tav>
+                                        <p:tav tm="100000">
+                                          <p:val>
+                                            <p:strVal val="#ppt_x"/>
+                                          </p:val>
+                                        </p:tav>
+                                      </p:tavLst>
+                                    </p:anim>
+                                    <p:anim calcmode="lin" valueType="num">
+                                      <p:cBhvr additive="base">
+                                        <p:cTn id="26" dur="500" fill="hold"/>
+                                        <p:tgtEl>
+                                          <p:spTgt spid="3">
+                                            <p:txEl>
+                                              <p:pRg st="4" end="4"/>
+                                            </p:txEl>
+                                          </p:spTgt>
+                                        </p:tgtEl>
+                                        <p:attrNameLst>
+                                          <p:attrName>ppt_y</p:attrName>
+                                        </p:attrNameLst>
+                                      </p:cBhvr>
+                                      <p:tavLst>
+                                        <p:tav tm="0">
+                                          <p:val>
+                                            <p:strVal val="#ppt_y"/>
+                                          </p:val>
+                                        </p:tav>
+                                        <p:tav tm="100000">
+                                          <p:val>
+                                            <p:strVal val="#ppt_y"/>
+                                          </p:val>
+                                        </p:tav>
+                                      </p:tavLst>
+                                    </p:anim>
+                                  </p:childTnLst>
+                                </p:cTn>
+                              </p:par>
+                              <p:par>
+                                <p:cTn id="27" presetID="2" presetClass="entr" presetSubtype="2" fill="hold" nodeType="withEffect">
+                                  <p:stCondLst>
+                                    <p:cond delay="0"/>
+                                  </p:stCondLst>
+                                  <p:childTnLst>
+                                    <p:set>
+                                      <p:cBhvr>
+                                        <p:cTn id="28" dur="1" fill="hold">
+                                          <p:stCondLst>
+                                            <p:cond delay="0"/>
+                                          </p:stCondLst>
+                                        </p:cTn>
+                                        <p:tgtEl>
+                                          <p:spTgt spid="3">
+                                            <p:txEl>
+                                              <p:pRg st="5" end="5"/>
+                                            </p:txEl>
+                                          </p:spTgt>
+                                        </p:tgtEl>
+                                        <p:attrNameLst>
+                                          <p:attrName>style.visibility</p:attrName>
+                                        </p:attrNameLst>
+                                      </p:cBhvr>
+                                      <p:to>
+                                        <p:strVal val="visible"/>
+                                      </p:to>
+                                    </p:set>
+                                    <p:anim calcmode="lin" valueType="num">
+                                      <p:cBhvr additive="base">
+                                        <p:cTn id="29" dur="500" fill="hold"/>
+                                        <p:tgtEl>
+                                          <p:spTgt spid="3">
+                                            <p:txEl>
+                                              <p:pRg st="5" end="5"/>
+                                            </p:txEl>
+                                          </p:spTgt>
+                                        </p:tgtEl>
+                                        <p:attrNameLst>
+                                          <p:attrName>ppt_x</p:attrName>
+                                        </p:attrNameLst>
+                                      </p:cBhvr>
+                                      <p:tavLst>
+                                        <p:tav tm="0">
+                                          <p:val>
+                                            <p:strVal val="1+#ppt_w/2"/>
+                                          </p:val>
+                                        </p:tav>
+                                        <p:tav tm="100000">
+                                          <p:val>
+                                            <p:strVal val="#ppt_x"/>
+                                          </p:val>
+                                        </p:tav>
+                                      </p:tavLst>
+                                    </p:anim>
+                                    <p:anim calcmode="lin" valueType="num">
+                                      <p:cBhvr additive="base">
+                                        <p:cTn id="30" dur="500" fill="hold"/>
+                                        <p:tgtEl>
+                                          <p:spTgt spid="3">
+                                            <p:txEl>
+                                              <p:pRg st="5" end="5"/>
+                                            </p:txEl>
+                                          </p:spTgt>
+                                        </p:tgtEl>
+                                        <p:attrNameLst>
+                                          <p:attrName>ppt_y</p:attrName>
+                                        </p:attrNameLst>
+                                      </p:cBhvr>
+                                      <p:tavLst>
+                                        <p:tav tm="0">
+                                          <p:val>
+                                            <p:strVal val="#ppt_y"/>
+                                          </p:val>
+                                        </p:tav>
+                                        <p:tav tm="100000">
+                                          <p:val>
+                                            <p:strVal val="#ppt_y"/>
+                                          </p:val>
+                                        </p:tav>
+                                      </p:tavLst>
+                                    </p:anim>
+                                  </p:childTnLst>
+                                </p:cTn>
+                              </p:par>
+                            </p:childTnLst>
+                          </p:cTn>
+                        </p:par>
+                      </p:childTnLst>
+                    </p:cTn>
+                  </p:par>
+                </p:childTnLst>
+              </p:cTn>
+              <p:prevCondLst>
+                <p:cond evt="onPrev" delay="0">
+                  <p:tgtEl>
+                    <p:sldTgt/>
+                  </p:tgtEl>
+                </p:cond>
+              </p:prevCondLst>
+              <p:nextCondLst>
+                <p:cond evt="onNext" delay="0">
+                  <p:tgtEl>
+                    <p:sldTgt/>
+                  </p:tgtEl>
+                </p:cond>
+              </p:nextCondLst>
+            </p:seq>
+          </p:childTnLst>
+        </p:cTn>
       </p:par>
     </p:tnLst>
   </p:timing>
@@ -10252,9 +12018,16 @@
               <a:t>etc</a:t>
             </a:r>
             <a:r>
-              <a:rPr lang="fr-FR" dirty="0"/>
+              <a:rPr lang="fr-FR" dirty="0" smtClean="0"/>
               <a:t>)</a:t>
             </a:r>
+          </a:p>
+          <a:p>
+            <a:r>
+              <a:rPr lang="fr-FR" dirty="0" smtClean="0"/>
+              <a:t>- Développement long à mettre en place</a:t>
+            </a:r>
+            <a:endParaRPr lang="fr-FR" dirty="0"/>
           </a:p>
           <a:p>
             <a:pPr marL="0" indent="0">
@@ -10314,7 +12087,7 @@
         </p:blipFill>
         <p:spPr>
           <a:xfrm>
-            <a:off x="3742052" y="3959200"/>
+            <a:off x="3742052" y="4397082"/>
             <a:ext cx="2466975" cy="1933575"/>
           </a:xfrm>
           <a:prstGeom prst="rect">
@@ -10345,7 +12118,7 @@
         </p:blipFill>
         <p:spPr bwMode="auto">
           <a:xfrm>
-            <a:off x="7361867" y="3712154"/>
+            <a:off x="7361867" y="4150036"/>
             <a:ext cx="2157926" cy="2427668"/>
           </a:xfrm>
           <a:prstGeom prst="rect">
@@ -10376,7 +12149,494 @@
   <p:timing>
     <p:tnLst>
       <p:par>
-        <p:cTn id="1" dur="indefinite" restart="never" nodeType="tmRoot"/>
+        <p:cTn id="1" dur="indefinite" restart="never" nodeType="tmRoot">
+          <p:childTnLst>
+            <p:seq concurrent="1" nextAc="seek">
+              <p:cTn id="2" dur="indefinite" nodeType="mainSeq">
+                <p:childTnLst>
+                  <p:par>
+                    <p:cTn id="3" fill="hold">
+                      <p:stCondLst>
+                        <p:cond delay="indefinite"/>
+                        <p:cond evt="onBegin" delay="0">
+                          <p:tn val="2"/>
+                        </p:cond>
+                      </p:stCondLst>
+                      <p:childTnLst>
+                        <p:par>
+                          <p:cTn id="4" fill="hold">
+                            <p:stCondLst>
+                              <p:cond delay="0"/>
+                            </p:stCondLst>
+                            <p:childTnLst>
+                              <p:par>
+                                <p:cTn id="5" presetID="2" presetClass="entr" presetSubtype="2" fill="hold" nodeType="withEffect">
+                                  <p:stCondLst>
+                                    <p:cond delay="0"/>
+                                  </p:stCondLst>
+                                  <p:childTnLst>
+                                    <p:set>
+                                      <p:cBhvr>
+                                        <p:cTn id="6" dur="1" fill="hold">
+                                          <p:stCondLst>
+                                            <p:cond delay="0"/>
+                                          </p:stCondLst>
+                                        </p:cTn>
+                                        <p:tgtEl>
+                                          <p:spTgt spid="3">
+                                            <p:txEl>
+                                              <p:pRg st="0" end="0"/>
+                                            </p:txEl>
+                                          </p:spTgt>
+                                        </p:tgtEl>
+                                        <p:attrNameLst>
+                                          <p:attrName>style.visibility</p:attrName>
+                                        </p:attrNameLst>
+                                      </p:cBhvr>
+                                      <p:to>
+                                        <p:strVal val="visible"/>
+                                      </p:to>
+                                    </p:set>
+                                    <p:anim calcmode="lin" valueType="num">
+                                      <p:cBhvr additive="base">
+                                        <p:cTn id="7" dur="500" fill="hold"/>
+                                        <p:tgtEl>
+                                          <p:spTgt spid="3">
+                                            <p:txEl>
+                                              <p:pRg st="0" end="0"/>
+                                            </p:txEl>
+                                          </p:spTgt>
+                                        </p:tgtEl>
+                                        <p:attrNameLst>
+                                          <p:attrName>ppt_x</p:attrName>
+                                        </p:attrNameLst>
+                                      </p:cBhvr>
+                                      <p:tavLst>
+                                        <p:tav tm="0">
+                                          <p:val>
+                                            <p:strVal val="1+#ppt_w/2"/>
+                                          </p:val>
+                                        </p:tav>
+                                        <p:tav tm="100000">
+                                          <p:val>
+                                            <p:strVal val="#ppt_x"/>
+                                          </p:val>
+                                        </p:tav>
+                                      </p:tavLst>
+                                    </p:anim>
+                                    <p:anim calcmode="lin" valueType="num">
+                                      <p:cBhvr additive="base">
+                                        <p:cTn id="8" dur="500" fill="hold"/>
+                                        <p:tgtEl>
+                                          <p:spTgt spid="3">
+                                            <p:txEl>
+                                              <p:pRg st="0" end="0"/>
+                                            </p:txEl>
+                                          </p:spTgt>
+                                        </p:tgtEl>
+                                        <p:attrNameLst>
+                                          <p:attrName>ppt_y</p:attrName>
+                                        </p:attrNameLst>
+                                      </p:cBhvr>
+                                      <p:tavLst>
+                                        <p:tav tm="0">
+                                          <p:val>
+                                            <p:strVal val="#ppt_y"/>
+                                          </p:val>
+                                        </p:tav>
+                                        <p:tav tm="100000">
+                                          <p:val>
+                                            <p:strVal val="#ppt_y"/>
+                                          </p:val>
+                                        </p:tav>
+                                      </p:tavLst>
+                                    </p:anim>
+                                  </p:childTnLst>
+                                </p:cTn>
+                              </p:par>
+                              <p:par>
+                                <p:cTn id="9" presetID="2" presetClass="entr" presetSubtype="2" fill="hold" nodeType="withEffect">
+                                  <p:stCondLst>
+                                    <p:cond delay="0"/>
+                                  </p:stCondLst>
+                                  <p:childTnLst>
+                                    <p:set>
+                                      <p:cBhvr>
+                                        <p:cTn id="10" dur="1" fill="hold">
+                                          <p:stCondLst>
+                                            <p:cond delay="0"/>
+                                          </p:stCondLst>
+                                        </p:cTn>
+                                        <p:tgtEl>
+                                          <p:spTgt spid="3">
+                                            <p:txEl>
+                                              <p:pRg st="1" end="1"/>
+                                            </p:txEl>
+                                          </p:spTgt>
+                                        </p:tgtEl>
+                                        <p:attrNameLst>
+                                          <p:attrName>style.visibility</p:attrName>
+                                        </p:attrNameLst>
+                                      </p:cBhvr>
+                                      <p:to>
+                                        <p:strVal val="visible"/>
+                                      </p:to>
+                                    </p:set>
+                                    <p:anim calcmode="lin" valueType="num">
+                                      <p:cBhvr additive="base">
+                                        <p:cTn id="11" dur="500" fill="hold"/>
+                                        <p:tgtEl>
+                                          <p:spTgt spid="3">
+                                            <p:txEl>
+                                              <p:pRg st="1" end="1"/>
+                                            </p:txEl>
+                                          </p:spTgt>
+                                        </p:tgtEl>
+                                        <p:attrNameLst>
+                                          <p:attrName>ppt_x</p:attrName>
+                                        </p:attrNameLst>
+                                      </p:cBhvr>
+                                      <p:tavLst>
+                                        <p:tav tm="0">
+                                          <p:val>
+                                            <p:strVal val="1+#ppt_w/2"/>
+                                          </p:val>
+                                        </p:tav>
+                                        <p:tav tm="100000">
+                                          <p:val>
+                                            <p:strVal val="#ppt_x"/>
+                                          </p:val>
+                                        </p:tav>
+                                      </p:tavLst>
+                                    </p:anim>
+                                    <p:anim calcmode="lin" valueType="num">
+                                      <p:cBhvr additive="base">
+                                        <p:cTn id="12" dur="500" fill="hold"/>
+                                        <p:tgtEl>
+                                          <p:spTgt spid="3">
+                                            <p:txEl>
+                                              <p:pRg st="1" end="1"/>
+                                            </p:txEl>
+                                          </p:spTgt>
+                                        </p:tgtEl>
+                                        <p:attrNameLst>
+                                          <p:attrName>ppt_y</p:attrName>
+                                        </p:attrNameLst>
+                                      </p:cBhvr>
+                                      <p:tavLst>
+                                        <p:tav tm="0">
+                                          <p:val>
+                                            <p:strVal val="#ppt_y"/>
+                                          </p:val>
+                                        </p:tav>
+                                        <p:tav tm="100000">
+                                          <p:val>
+                                            <p:strVal val="#ppt_y"/>
+                                          </p:val>
+                                        </p:tav>
+                                      </p:tavLst>
+                                    </p:anim>
+                                  </p:childTnLst>
+                                </p:cTn>
+                              </p:par>
+                            </p:childTnLst>
+                          </p:cTn>
+                        </p:par>
+                      </p:childTnLst>
+                    </p:cTn>
+                  </p:par>
+                  <p:par>
+                    <p:cTn id="13" fill="hold">
+                      <p:stCondLst>
+                        <p:cond delay="indefinite"/>
+                      </p:stCondLst>
+                      <p:childTnLst>
+                        <p:par>
+                          <p:cTn id="14" fill="hold">
+                            <p:stCondLst>
+                              <p:cond delay="0"/>
+                            </p:stCondLst>
+                            <p:childTnLst>
+                              <p:par>
+                                <p:cTn id="15" presetID="2" presetClass="entr" presetSubtype="2" fill="hold" nodeType="clickEffect">
+                                  <p:stCondLst>
+                                    <p:cond delay="0"/>
+                                  </p:stCondLst>
+                                  <p:childTnLst>
+                                    <p:set>
+                                      <p:cBhvr>
+                                        <p:cTn id="16" dur="1" fill="hold">
+                                          <p:stCondLst>
+                                            <p:cond delay="0"/>
+                                          </p:stCondLst>
+                                        </p:cTn>
+                                        <p:tgtEl>
+                                          <p:spTgt spid="3">
+                                            <p:txEl>
+                                              <p:pRg st="2" end="2"/>
+                                            </p:txEl>
+                                          </p:spTgt>
+                                        </p:tgtEl>
+                                        <p:attrNameLst>
+                                          <p:attrName>style.visibility</p:attrName>
+                                        </p:attrNameLst>
+                                      </p:cBhvr>
+                                      <p:to>
+                                        <p:strVal val="visible"/>
+                                      </p:to>
+                                    </p:set>
+                                    <p:anim calcmode="lin" valueType="num">
+                                      <p:cBhvr additive="base">
+                                        <p:cTn id="17" dur="500" fill="hold"/>
+                                        <p:tgtEl>
+                                          <p:spTgt spid="3">
+                                            <p:txEl>
+                                              <p:pRg st="2" end="2"/>
+                                            </p:txEl>
+                                          </p:spTgt>
+                                        </p:tgtEl>
+                                        <p:attrNameLst>
+                                          <p:attrName>ppt_x</p:attrName>
+                                        </p:attrNameLst>
+                                      </p:cBhvr>
+                                      <p:tavLst>
+                                        <p:tav tm="0">
+                                          <p:val>
+                                            <p:strVal val="1+#ppt_w/2"/>
+                                          </p:val>
+                                        </p:tav>
+                                        <p:tav tm="100000">
+                                          <p:val>
+                                            <p:strVal val="#ppt_x"/>
+                                          </p:val>
+                                        </p:tav>
+                                      </p:tavLst>
+                                    </p:anim>
+                                    <p:anim calcmode="lin" valueType="num">
+                                      <p:cBhvr additive="base">
+                                        <p:cTn id="18" dur="500" fill="hold"/>
+                                        <p:tgtEl>
+                                          <p:spTgt spid="3">
+                                            <p:txEl>
+                                              <p:pRg st="2" end="2"/>
+                                            </p:txEl>
+                                          </p:spTgt>
+                                        </p:tgtEl>
+                                        <p:attrNameLst>
+                                          <p:attrName>ppt_y</p:attrName>
+                                        </p:attrNameLst>
+                                      </p:cBhvr>
+                                      <p:tavLst>
+                                        <p:tav tm="0">
+                                          <p:val>
+                                            <p:strVal val="#ppt_y"/>
+                                          </p:val>
+                                        </p:tav>
+                                        <p:tav tm="100000">
+                                          <p:val>
+                                            <p:strVal val="#ppt_y"/>
+                                          </p:val>
+                                        </p:tav>
+                                      </p:tavLst>
+                                    </p:anim>
+                                  </p:childTnLst>
+                                </p:cTn>
+                              </p:par>
+                              <p:par>
+                                <p:cTn id="19" presetID="2" presetClass="entr" presetSubtype="2" fill="hold" nodeType="withEffect">
+                                  <p:stCondLst>
+                                    <p:cond delay="0"/>
+                                  </p:stCondLst>
+                                  <p:childTnLst>
+                                    <p:set>
+                                      <p:cBhvr>
+                                        <p:cTn id="20" dur="1" fill="hold">
+                                          <p:stCondLst>
+                                            <p:cond delay="0"/>
+                                          </p:stCondLst>
+                                        </p:cTn>
+                                        <p:tgtEl>
+                                          <p:spTgt spid="3">
+                                            <p:txEl>
+                                              <p:pRg st="3" end="3"/>
+                                            </p:txEl>
+                                          </p:spTgt>
+                                        </p:tgtEl>
+                                        <p:attrNameLst>
+                                          <p:attrName>style.visibility</p:attrName>
+                                        </p:attrNameLst>
+                                      </p:cBhvr>
+                                      <p:to>
+                                        <p:strVal val="visible"/>
+                                      </p:to>
+                                    </p:set>
+                                    <p:anim calcmode="lin" valueType="num">
+                                      <p:cBhvr additive="base">
+                                        <p:cTn id="21" dur="500" fill="hold"/>
+                                        <p:tgtEl>
+                                          <p:spTgt spid="3">
+                                            <p:txEl>
+                                              <p:pRg st="3" end="3"/>
+                                            </p:txEl>
+                                          </p:spTgt>
+                                        </p:tgtEl>
+                                        <p:attrNameLst>
+                                          <p:attrName>ppt_x</p:attrName>
+                                        </p:attrNameLst>
+                                      </p:cBhvr>
+                                      <p:tavLst>
+                                        <p:tav tm="0">
+                                          <p:val>
+                                            <p:strVal val="1+#ppt_w/2"/>
+                                          </p:val>
+                                        </p:tav>
+                                        <p:tav tm="100000">
+                                          <p:val>
+                                            <p:strVal val="#ppt_x"/>
+                                          </p:val>
+                                        </p:tav>
+                                      </p:tavLst>
+                                    </p:anim>
+                                    <p:anim calcmode="lin" valueType="num">
+                                      <p:cBhvr additive="base">
+                                        <p:cTn id="22" dur="500" fill="hold"/>
+                                        <p:tgtEl>
+                                          <p:spTgt spid="3">
+                                            <p:txEl>
+                                              <p:pRg st="3" end="3"/>
+                                            </p:txEl>
+                                          </p:spTgt>
+                                        </p:tgtEl>
+                                        <p:attrNameLst>
+                                          <p:attrName>ppt_y</p:attrName>
+                                        </p:attrNameLst>
+                                      </p:cBhvr>
+                                      <p:tavLst>
+                                        <p:tav tm="0">
+                                          <p:val>
+                                            <p:strVal val="#ppt_y"/>
+                                          </p:val>
+                                        </p:tav>
+                                        <p:tav tm="100000">
+                                          <p:val>
+                                            <p:strVal val="#ppt_y"/>
+                                          </p:val>
+                                        </p:tav>
+                                      </p:tavLst>
+                                    </p:anim>
+                                  </p:childTnLst>
+                                </p:cTn>
+                              </p:par>
+                              <p:par>
+                                <p:cTn id="23" presetID="2" presetClass="entr" presetSubtype="2" fill="hold" nodeType="withEffect">
+                                  <p:stCondLst>
+                                    <p:cond delay="0"/>
+                                  </p:stCondLst>
+                                  <p:childTnLst>
+                                    <p:set>
+                                      <p:cBhvr>
+                                        <p:cTn id="24" dur="1" fill="hold">
+                                          <p:stCondLst>
+                                            <p:cond delay="0"/>
+                                          </p:stCondLst>
+                                        </p:cTn>
+                                        <p:tgtEl>
+                                          <p:spTgt spid="3">
+                                            <p:txEl>
+                                              <p:pRg st="4" end="4"/>
+                                            </p:txEl>
+                                          </p:spTgt>
+                                        </p:tgtEl>
+                                        <p:attrNameLst>
+                                          <p:attrName>style.visibility</p:attrName>
+                                        </p:attrNameLst>
+                                      </p:cBhvr>
+                                      <p:to>
+                                        <p:strVal val="visible"/>
+                                      </p:to>
+                                    </p:set>
+                                    <p:anim calcmode="lin" valueType="num">
+                                      <p:cBhvr additive="base">
+                                        <p:cTn id="25" dur="500" fill="hold"/>
+                                        <p:tgtEl>
+                                          <p:spTgt spid="3">
+                                            <p:txEl>
+                                              <p:pRg st="4" end="4"/>
+                                            </p:txEl>
+                                          </p:spTgt>
+                                        </p:tgtEl>
+                                        <p:attrNameLst>
+                                          <p:attrName>ppt_x</p:attrName>
+                                        </p:attrNameLst>
+                                      </p:cBhvr>
+                                      <p:tavLst>
+                                        <p:tav tm="0">
+                                          <p:val>
+                                            <p:strVal val="1+#ppt_w/2"/>
+                                          </p:val>
+                                        </p:tav>
+                                        <p:tav tm="100000">
+                                          <p:val>
+                                            <p:strVal val="#ppt_x"/>
+                                          </p:val>
+                                        </p:tav>
+                                      </p:tavLst>
+                                    </p:anim>
+                                    <p:anim calcmode="lin" valueType="num">
+                                      <p:cBhvr additive="base">
+                                        <p:cTn id="26" dur="500" fill="hold"/>
+                                        <p:tgtEl>
+                                          <p:spTgt spid="3">
+                                            <p:txEl>
+                                              <p:pRg st="4" end="4"/>
+                                            </p:txEl>
+                                          </p:spTgt>
+                                        </p:tgtEl>
+                                        <p:attrNameLst>
+                                          <p:attrName>ppt_y</p:attrName>
+                                        </p:attrNameLst>
+                                      </p:cBhvr>
+                                      <p:tavLst>
+                                        <p:tav tm="0">
+                                          <p:val>
+                                            <p:strVal val="#ppt_y"/>
+                                          </p:val>
+                                        </p:tav>
+                                        <p:tav tm="100000">
+                                          <p:val>
+                                            <p:strVal val="#ppt_y"/>
+                                          </p:val>
+                                        </p:tav>
+                                      </p:tavLst>
+                                    </p:anim>
+                                  </p:childTnLst>
+                                </p:cTn>
+                              </p:par>
+                            </p:childTnLst>
+                          </p:cTn>
+                        </p:par>
+                      </p:childTnLst>
+                    </p:cTn>
+                  </p:par>
+                </p:childTnLst>
+              </p:cTn>
+              <p:prevCondLst>
+                <p:cond evt="onPrev" delay="0">
+                  <p:tgtEl>
+                    <p:sldTgt/>
+                  </p:tgtEl>
+                </p:cond>
+              </p:prevCondLst>
+              <p:nextCondLst>
+                <p:cond evt="onNext" delay="0">
+                  <p:tgtEl>
+                    <p:sldTgt/>
+                  </p:tgtEl>
+                </p:cond>
+              </p:nextCondLst>
+            </p:seq>
+          </p:childTnLst>
+        </p:cTn>
       </p:par>
     </p:tnLst>
   </p:timing>
@@ -10603,7 +12863,409 @@
   <p:timing>
     <p:tnLst>
       <p:par>
-        <p:cTn id="1" dur="indefinite" restart="never" nodeType="tmRoot"/>
+        <p:cTn id="1" dur="indefinite" restart="never" nodeType="tmRoot">
+          <p:childTnLst>
+            <p:seq concurrent="1" nextAc="seek">
+              <p:cTn id="2" dur="indefinite" nodeType="mainSeq">
+                <p:childTnLst>
+                  <p:par>
+                    <p:cTn id="3" fill="hold">
+                      <p:stCondLst>
+                        <p:cond delay="indefinite"/>
+                        <p:cond evt="onBegin" delay="0">
+                          <p:tn val="2"/>
+                        </p:cond>
+                      </p:stCondLst>
+                      <p:childTnLst>
+                        <p:par>
+                          <p:cTn id="4" fill="hold">
+                            <p:stCondLst>
+                              <p:cond delay="0"/>
+                            </p:stCondLst>
+                            <p:childTnLst>
+                              <p:par>
+                                <p:cTn id="5" presetID="2" presetClass="entr" presetSubtype="2" fill="hold" nodeType="withEffect">
+                                  <p:stCondLst>
+                                    <p:cond delay="0"/>
+                                  </p:stCondLst>
+                                  <p:childTnLst>
+                                    <p:set>
+                                      <p:cBhvr>
+                                        <p:cTn id="6" dur="1" fill="hold">
+                                          <p:stCondLst>
+                                            <p:cond delay="0"/>
+                                          </p:stCondLst>
+                                        </p:cTn>
+                                        <p:tgtEl>
+                                          <p:spTgt spid="3">
+                                            <p:txEl>
+                                              <p:pRg st="0" end="0"/>
+                                            </p:txEl>
+                                          </p:spTgt>
+                                        </p:tgtEl>
+                                        <p:attrNameLst>
+                                          <p:attrName>style.visibility</p:attrName>
+                                        </p:attrNameLst>
+                                      </p:cBhvr>
+                                      <p:to>
+                                        <p:strVal val="visible"/>
+                                      </p:to>
+                                    </p:set>
+                                    <p:anim calcmode="lin" valueType="num">
+                                      <p:cBhvr additive="base">
+                                        <p:cTn id="7" dur="500" fill="hold"/>
+                                        <p:tgtEl>
+                                          <p:spTgt spid="3">
+                                            <p:txEl>
+                                              <p:pRg st="0" end="0"/>
+                                            </p:txEl>
+                                          </p:spTgt>
+                                        </p:tgtEl>
+                                        <p:attrNameLst>
+                                          <p:attrName>ppt_x</p:attrName>
+                                        </p:attrNameLst>
+                                      </p:cBhvr>
+                                      <p:tavLst>
+                                        <p:tav tm="0">
+                                          <p:val>
+                                            <p:strVal val="1+#ppt_w/2"/>
+                                          </p:val>
+                                        </p:tav>
+                                        <p:tav tm="100000">
+                                          <p:val>
+                                            <p:strVal val="#ppt_x"/>
+                                          </p:val>
+                                        </p:tav>
+                                      </p:tavLst>
+                                    </p:anim>
+                                    <p:anim calcmode="lin" valueType="num">
+                                      <p:cBhvr additive="base">
+                                        <p:cTn id="8" dur="500" fill="hold"/>
+                                        <p:tgtEl>
+                                          <p:spTgt spid="3">
+                                            <p:txEl>
+                                              <p:pRg st="0" end="0"/>
+                                            </p:txEl>
+                                          </p:spTgt>
+                                        </p:tgtEl>
+                                        <p:attrNameLst>
+                                          <p:attrName>ppt_y</p:attrName>
+                                        </p:attrNameLst>
+                                      </p:cBhvr>
+                                      <p:tavLst>
+                                        <p:tav tm="0">
+                                          <p:val>
+                                            <p:strVal val="#ppt_y"/>
+                                          </p:val>
+                                        </p:tav>
+                                        <p:tav tm="100000">
+                                          <p:val>
+                                            <p:strVal val="#ppt_y"/>
+                                          </p:val>
+                                        </p:tav>
+                                      </p:tavLst>
+                                    </p:anim>
+                                  </p:childTnLst>
+                                </p:cTn>
+                              </p:par>
+                              <p:par>
+                                <p:cTn id="9" presetID="2" presetClass="entr" presetSubtype="2" fill="hold" nodeType="withEffect">
+                                  <p:stCondLst>
+                                    <p:cond delay="0"/>
+                                  </p:stCondLst>
+                                  <p:childTnLst>
+                                    <p:set>
+                                      <p:cBhvr>
+                                        <p:cTn id="10" dur="1" fill="hold">
+                                          <p:stCondLst>
+                                            <p:cond delay="0"/>
+                                          </p:stCondLst>
+                                        </p:cTn>
+                                        <p:tgtEl>
+                                          <p:spTgt spid="3">
+                                            <p:txEl>
+                                              <p:pRg st="1" end="1"/>
+                                            </p:txEl>
+                                          </p:spTgt>
+                                        </p:tgtEl>
+                                        <p:attrNameLst>
+                                          <p:attrName>style.visibility</p:attrName>
+                                        </p:attrNameLst>
+                                      </p:cBhvr>
+                                      <p:to>
+                                        <p:strVal val="visible"/>
+                                      </p:to>
+                                    </p:set>
+                                    <p:anim calcmode="lin" valueType="num">
+                                      <p:cBhvr additive="base">
+                                        <p:cTn id="11" dur="500" fill="hold"/>
+                                        <p:tgtEl>
+                                          <p:spTgt spid="3">
+                                            <p:txEl>
+                                              <p:pRg st="1" end="1"/>
+                                            </p:txEl>
+                                          </p:spTgt>
+                                        </p:tgtEl>
+                                        <p:attrNameLst>
+                                          <p:attrName>ppt_x</p:attrName>
+                                        </p:attrNameLst>
+                                      </p:cBhvr>
+                                      <p:tavLst>
+                                        <p:tav tm="0">
+                                          <p:val>
+                                            <p:strVal val="1+#ppt_w/2"/>
+                                          </p:val>
+                                        </p:tav>
+                                        <p:tav tm="100000">
+                                          <p:val>
+                                            <p:strVal val="#ppt_x"/>
+                                          </p:val>
+                                        </p:tav>
+                                      </p:tavLst>
+                                    </p:anim>
+                                    <p:anim calcmode="lin" valueType="num">
+                                      <p:cBhvr additive="base">
+                                        <p:cTn id="12" dur="500" fill="hold"/>
+                                        <p:tgtEl>
+                                          <p:spTgt spid="3">
+                                            <p:txEl>
+                                              <p:pRg st="1" end="1"/>
+                                            </p:txEl>
+                                          </p:spTgt>
+                                        </p:tgtEl>
+                                        <p:attrNameLst>
+                                          <p:attrName>ppt_y</p:attrName>
+                                        </p:attrNameLst>
+                                      </p:cBhvr>
+                                      <p:tavLst>
+                                        <p:tav tm="0">
+                                          <p:val>
+                                            <p:strVal val="#ppt_y"/>
+                                          </p:val>
+                                        </p:tav>
+                                        <p:tav tm="100000">
+                                          <p:val>
+                                            <p:strVal val="#ppt_y"/>
+                                          </p:val>
+                                        </p:tav>
+                                      </p:tavLst>
+                                    </p:anim>
+                                  </p:childTnLst>
+                                </p:cTn>
+                              </p:par>
+                              <p:par>
+                                <p:cTn id="13" presetID="2" presetClass="entr" presetSubtype="2" fill="hold" nodeType="withEffect">
+                                  <p:stCondLst>
+                                    <p:cond delay="0"/>
+                                  </p:stCondLst>
+                                  <p:childTnLst>
+                                    <p:set>
+                                      <p:cBhvr>
+                                        <p:cTn id="14" dur="1" fill="hold">
+                                          <p:stCondLst>
+                                            <p:cond delay="0"/>
+                                          </p:stCondLst>
+                                        </p:cTn>
+                                        <p:tgtEl>
+                                          <p:spTgt spid="3">
+                                            <p:txEl>
+                                              <p:pRg st="2" end="2"/>
+                                            </p:txEl>
+                                          </p:spTgt>
+                                        </p:tgtEl>
+                                        <p:attrNameLst>
+                                          <p:attrName>style.visibility</p:attrName>
+                                        </p:attrNameLst>
+                                      </p:cBhvr>
+                                      <p:to>
+                                        <p:strVal val="visible"/>
+                                      </p:to>
+                                    </p:set>
+                                    <p:anim calcmode="lin" valueType="num">
+                                      <p:cBhvr additive="base">
+                                        <p:cTn id="15" dur="500" fill="hold"/>
+                                        <p:tgtEl>
+                                          <p:spTgt spid="3">
+                                            <p:txEl>
+                                              <p:pRg st="2" end="2"/>
+                                            </p:txEl>
+                                          </p:spTgt>
+                                        </p:tgtEl>
+                                        <p:attrNameLst>
+                                          <p:attrName>ppt_x</p:attrName>
+                                        </p:attrNameLst>
+                                      </p:cBhvr>
+                                      <p:tavLst>
+                                        <p:tav tm="0">
+                                          <p:val>
+                                            <p:strVal val="1+#ppt_w/2"/>
+                                          </p:val>
+                                        </p:tav>
+                                        <p:tav tm="100000">
+                                          <p:val>
+                                            <p:strVal val="#ppt_x"/>
+                                          </p:val>
+                                        </p:tav>
+                                      </p:tavLst>
+                                    </p:anim>
+                                    <p:anim calcmode="lin" valueType="num">
+                                      <p:cBhvr additive="base">
+                                        <p:cTn id="16" dur="500" fill="hold"/>
+                                        <p:tgtEl>
+                                          <p:spTgt spid="3">
+                                            <p:txEl>
+                                              <p:pRg st="2" end="2"/>
+                                            </p:txEl>
+                                          </p:spTgt>
+                                        </p:tgtEl>
+                                        <p:attrNameLst>
+                                          <p:attrName>ppt_y</p:attrName>
+                                        </p:attrNameLst>
+                                      </p:cBhvr>
+                                      <p:tavLst>
+                                        <p:tav tm="0">
+                                          <p:val>
+                                            <p:strVal val="#ppt_y"/>
+                                          </p:val>
+                                        </p:tav>
+                                        <p:tav tm="100000">
+                                          <p:val>
+                                            <p:strVal val="#ppt_y"/>
+                                          </p:val>
+                                        </p:tav>
+                                      </p:tavLst>
+                                    </p:anim>
+                                  </p:childTnLst>
+                                </p:cTn>
+                              </p:par>
+                            </p:childTnLst>
+                          </p:cTn>
+                        </p:par>
+                      </p:childTnLst>
+                    </p:cTn>
+                  </p:par>
+                  <p:par>
+                    <p:cTn id="17" fill="hold">
+                      <p:stCondLst>
+                        <p:cond delay="indefinite"/>
+                      </p:stCondLst>
+                      <p:childTnLst>
+                        <p:par>
+                          <p:cTn id="18" fill="hold">
+                            <p:stCondLst>
+                              <p:cond delay="0"/>
+                            </p:stCondLst>
+                            <p:childTnLst>
+                              <p:par>
+                                <p:cTn id="19" presetID="2" presetClass="entr" presetSubtype="2" fill="hold" nodeType="clickEffect">
+                                  <p:stCondLst>
+                                    <p:cond delay="0"/>
+                                  </p:stCondLst>
+                                  <p:childTnLst>
+                                    <p:set>
+                                      <p:cBhvr>
+                                        <p:cTn id="20" dur="1" fill="hold">
+                                          <p:stCondLst>
+                                            <p:cond delay="0"/>
+                                          </p:stCondLst>
+                                        </p:cTn>
+                                        <p:tgtEl>
+                                          <p:spTgt spid="3">
+                                            <p:txEl>
+                                              <p:pRg st="3" end="3"/>
+                                            </p:txEl>
+                                          </p:spTgt>
+                                        </p:tgtEl>
+                                        <p:attrNameLst>
+                                          <p:attrName>style.visibility</p:attrName>
+                                        </p:attrNameLst>
+                                      </p:cBhvr>
+                                      <p:to>
+                                        <p:strVal val="visible"/>
+                                      </p:to>
+                                    </p:set>
+                                    <p:anim calcmode="lin" valueType="num">
+                                      <p:cBhvr additive="base">
+                                        <p:cTn id="21" dur="500" fill="hold"/>
+                                        <p:tgtEl>
+                                          <p:spTgt spid="3">
+                                            <p:txEl>
+                                              <p:pRg st="3" end="3"/>
+                                            </p:txEl>
+                                          </p:spTgt>
+                                        </p:tgtEl>
+                                        <p:attrNameLst>
+                                          <p:attrName>ppt_x</p:attrName>
+                                        </p:attrNameLst>
+                                      </p:cBhvr>
+                                      <p:tavLst>
+                                        <p:tav tm="0">
+                                          <p:val>
+                                            <p:strVal val="1+#ppt_w/2"/>
+                                          </p:val>
+                                        </p:tav>
+                                        <p:tav tm="100000">
+                                          <p:val>
+                                            <p:strVal val="#ppt_x"/>
+                                          </p:val>
+                                        </p:tav>
+                                      </p:tavLst>
+                                    </p:anim>
+                                    <p:anim calcmode="lin" valueType="num">
+                                      <p:cBhvr additive="base">
+                                        <p:cTn id="22" dur="500" fill="hold"/>
+                                        <p:tgtEl>
+                                          <p:spTgt spid="3">
+                                            <p:txEl>
+                                              <p:pRg st="3" end="3"/>
+                                            </p:txEl>
+                                          </p:spTgt>
+                                        </p:tgtEl>
+                                        <p:attrNameLst>
+                                          <p:attrName>ppt_y</p:attrName>
+                                        </p:attrNameLst>
+                                      </p:cBhvr>
+                                      <p:tavLst>
+                                        <p:tav tm="0">
+                                          <p:val>
+                                            <p:strVal val="#ppt_y"/>
+                                          </p:val>
+                                        </p:tav>
+                                        <p:tav tm="100000">
+                                          <p:val>
+                                            <p:strVal val="#ppt_y"/>
+                                          </p:val>
+                                        </p:tav>
+                                      </p:tavLst>
+                                    </p:anim>
+                                  </p:childTnLst>
+                                </p:cTn>
+                              </p:par>
+                            </p:childTnLst>
+                          </p:cTn>
+                        </p:par>
+                      </p:childTnLst>
+                    </p:cTn>
+                  </p:par>
+                </p:childTnLst>
+              </p:cTn>
+              <p:prevCondLst>
+                <p:cond evt="onPrev" delay="0">
+                  <p:tgtEl>
+                    <p:sldTgt/>
+                  </p:tgtEl>
+                </p:cond>
+              </p:prevCondLst>
+              <p:nextCondLst>
+                <p:cond evt="onNext" delay="0">
+                  <p:tgtEl>
+                    <p:sldTgt/>
+                  </p:tgtEl>
+                </p:cond>
+              </p:nextCondLst>
+            </p:seq>
+          </p:childTnLst>
+        </p:cTn>
       </p:par>
     </p:tnLst>
   </p:timing>

</xml_diff>